<commit_message>
Add chart data summary function
</commit_message>
<xml_diff>
--- a/Function Map.pptx
+++ b/Function Map.pptx
@@ -7,6 +7,7 @@
   <p:sldIdLst>
     <p:sldId id="256" r:id="rId2"/>
     <p:sldId id="257" r:id="rId3"/>
+    <p:sldId id="258" r:id="rId4"/>
   </p:sldIdLst>
   <p:sldSz cx="12192000" cy="6858000"/>
   <p:notesSz cx="6858000" cy="9144000"/>
@@ -113,6 +114,1860 @@
 </p:presentation>
 </file>
 
+<file path=ppt/charts/chart1.xml><?xml version="1.0" encoding="utf-8"?>
+<c:chartSpace xmlns:c="http://schemas.openxmlformats.org/drawingml/2006/chart" xmlns:a="http://schemas.openxmlformats.org/drawingml/2006/main" xmlns:r="http://schemas.openxmlformats.org/officeDocument/2006/relationships" xmlns:c16r2="http://schemas.microsoft.com/office/drawing/2015/06/chart">
+  <c:date1904 val="0"/>
+  <c:lang val="en-US"/>
+  <c:roundedCorners val="0"/>
+  <mc:AlternateContent xmlns:mc="http://schemas.openxmlformats.org/markup-compatibility/2006">
+    <mc:Choice xmlns:c14="http://schemas.microsoft.com/office/drawing/2007/8/2/chart" Requires="c14">
+      <c14:style val="102"/>
+    </mc:Choice>
+    <mc:Fallback>
+      <c:style val="2"/>
+    </mc:Fallback>
+  </mc:AlternateContent>
+  <c:chart>
+    <c:autoTitleDeleted val="0"/>
+    <c:plotArea>
+      <c:layout>
+        <c:manualLayout>
+          <c:layoutTarget val="inner"/>
+          <c:xMode val="edge"/>
+          <c:yMode val="edge"/>
+          <c:x val="5.4711793603321061E-2"/>
+          <c:y val="4.9170506883443051E-2"/>
+          <c:w val="0.91400693780576747"/>
+          <c:h val="0.70123365194074894"/>
+        </c:manualLayout>
+      </c:layout>
+      <c:barChart>
+        <c:barDir val="col"/>
+        <c:grouping val="stacked"/>
+        <c:varyColors val="0"/>
+        <c:ser>
+          <c:idx val="0"/>
+          <c:order val="0"/>
+          <c:tx>
+            <c:strRef>
+              <c:f>Sheet1!$B$1</c:f>
+              <c:strCache>
+                <c:ptCount val="1"/>
+                <c:pt idx="0">
+                  <c:v>Contemporaneous</c:v>
+                </c:pt>
+              </c:strCache>
+            </c:strRef>
+          </c:tx>
+          <c:spPr>
+            <a:solidFill>
+              <a:schemeClr val="accent1"/>
+            </a:solidFill>
+            <a:ln>
+              <a:noFill/>
+            </a:ln>
+            <a:effectLst/>
+          </c:spPr>
+          <c:invertIfNegative val="0"/>
+          <c:cat>
+            <c:strRef>
+              <c:f>Sheet1!$A$2:$A$6</c:f>
+              <c:strCache>
+                <c:ptCount val="5"/>
+                <c:pt idx="0">
+                  <c:v>Mon</c:v>
+                </c:pt>
+                <c:pt idx="1">
+                  <c:v>Tue</c:v>
+                </c:pt>
+                <c:pt idx="2">
+                  <c:v>Wed</c:v>
+                </c:pt>
+                <c:pt idx="3">
+                  <c:v>Thur</c:v>
+                </c:pt>
+                <c:pt idx="4">
+                  <c:v>Fri</c:v>
+                </c:pt>
+              </c:strCache>
+            </c:strRef>
+          </c:cat>
+          <c:val>
+            <c:numRef>
+              <c:f>Sheet1!$B$2:$B$6</c:f>
+              <c:numCache>
+                <c:formatCode>General</c:formatCode>
+                <c:ptCount val="5"/>
+                <c:pt idx="0">
+                  <c:v>4.3</c:v>
+                </c:pt>
+                <c:pt idx="1">
+                  <c:v>2.5</c:v>
+                </c:pt>
+                <c:pt idx="2">
+                  <c:v>3.5</c:v>
+                </c:pt>
+                <c:pt idx="3">
+                  <c:v>4.5</c:v>
+                </c:pt>
+              </c:numCache>
+            </c:numRef>
+          </c:val>
+          <c:extLst>
+            <c:ext xmlns:c16="http://schemas.microsoft.com/office/drawing/2014/chart" uri="{C3380CC4-5D6E-409C-BE32-E72D297353CC}">
+              <c16:uniqueId val="{00000000-0CF1-4C09-91DE-DE356A498C0F}"/>
+            </c:ext>
+          </c:extLst>
+        </c:ser>
+        <c:ser>
+          <c:idx val="1"/>
+          <c:order val="1"/>
+          <c:tx>
+            <c:strRef>
+              <c:f>Sheet1!$C$1</c:f>
+              <c:strCache>
+                <c:ptCount val="1"/>
+                <c:pt idx="0">
+                  <c:v>After the fact</c:v>
+                </c:pt>
+              </c:strCache>
+            </c:strRef>
+          </c:tx>
+          <c:spPr>
+            <a:solidFill>
+              <a:schemeClr val="accent2"/>
+            </a:solidFill>
+            <a:ln>
+              <a:noFill/>
+            </a:ln>
+            <a:effectLst/>
+          </c:spPr>
+          <c:invertIfNegative val="0"/>
+          <c:cat>
+            <c:strRef>
+              <c:f>Sheet1!$A$2:$A$6</c:f>
+              <c:strCache>
+                <c:ptCount val="5"/>
+                <c:pt idx="0">
+                  <c:v>Mon</c:v>
+                </c:pt>
+                <c:pt idx="1">
+                  <c:v>Tue</c:v>
+                </c:pt>
+                <c:pt idx="2">
+                  <c:v>Wed</c:v>
+                </c:pt>
+                <c:pt idx="3">
+                  <c:v>Thur</c:v>
+                </c:pt>
+                <c:pt idx="4">
+                  <c:v>Fri</c:v>
+                </c:pt>
+              </c:strCache>
+            </c:strRef>
+          </c:cat>
+          <c:val>
+            <c:numRef>
+              <c:f>Sheet1!$C$2:$C$6</c:f>
+              <c:numCache>
+                <c:formatCode>General</c:formatCode>
+                <c:ptCount val="5"/>
+                <c:pt idx="0">
+                  <c:v>3</c:v>
+                </c:pt>
+                <c:pt idx="1">
+                  <c:v>2</c:v>
+                </c:pt>
+                <c:pt idx="2">
+                  <c:v>4</c:v>
+                </c:pt>
+                <c:pt idx="3">
+                  <c:v>5</c:v>
+                </c:pt>
+              </c:numCache>
+            </c:numRef>
+          </c:val>
+          <c:extLst>
+            <c:ext xmlns:c16="http://schemas.microsoft.com/office/drawing/2014/chart" uri="{C3380CC4-5D6E-409C-BE32-E72D297353CC}">
+              <c16:uniqueId val="{00000003-0CF1-4C09-91DE-DE356A498C0F}"/>
+            </c:ext>
+          </c:extLst>
+        </c:ser>
+        <c:dLbls>
+          <c:showLegendKey val="0"/>
+          <c:showVal val="0"/>
+          <c:showCatName val="0"/>
+          <c:showSerName val="0"/>
+          <c:showPercent val="0"/>
+          <c:showBubbleSize val="0"/>
+        </c:dLbls>
+        <c:gapWidth val="219"/>
+        <c:overlap val="100"/>
+        <c:axId val="419657776"/>
+        <c:axId val="419652200"/>
+      </c:barChart>
+      <c:catAx>
+        <c:axId val="419657776"/>
+        <c:scaling>
+          <c:orientation val="minMax"/>
+        </c:scaling>
+        <c:delete val="0"/>
+        <c:axPos val="b"/>
+        <c:numFmt formatCode="General" sourceLinked="1"/>
+        <c:majorTickMark val="none"/>
+        <c:minorTickMark val="none"/>
+        <c:tickLblPos val="nextTo"/>
+        <c:spPr>
+          <a:noFill/>
+          <a:ln w="9525" cap="flat" cmpd="sng" algn="ctr">
+            <a:solidFill>
+              <a:schemeClr val="tx1">
+                <a:lumMod val="15000"/>
+                <a:lumOff val="85000"/>
+              </a:schemeClr>
+            </a:solidFill>
+            <a:round/>
+          </a:ln>
+          <a:effectLst/>
+        </c:spPr>
+        <c:txPr>
+          <a:bodyPr rot="-60000000" spcFirstLastPara="1" vertOverflow="ellipsis" vert="horz" wrap="square" anchor="ctr" anchorCtr="1"/>
+          <a:lstStyle/>
+          <a:p>
+            <a:pPr>
+              <a:defRPr sz="1197" b="0" i="0" u="none" strike="noStrike" kern="1200" baseline="0">
+                <a:solidFill>
+                  <a:schemeClr val="tx1">
+                    <a:lumMod val="65000"/>
+                    <a:lumOff val="35000"/>
+                  </a:schemeClr>
+                </a:solidFill>
+                <a:latin typeface="+mn-lt"/>
+                <a:ea typeface="+mn-ea"/>
+                <a:cs typeface="+mn-cs"/>
+              </a:defRPr>
+            </a:pPr>
+            <a:endParaRPr lang="en-US"/>
+          </a:p>
+        </c:txPr>
+        <c:crossAx val="419652200"/>
+        <c:crosses val="autoZero"/>
+        <c:auto val="1"/>
+        <c:lblAlgn val="ctr"/>
+        <c:lblOffset val="100"/>
+        <c:noMultiLvlLbl val="0"/>
+      </c:catAx>
+      <c:valAx>
+        <c:axId val="419652200"/>
+        <c:scaling>
+          <c:orientation val="minMax"/>
+        </c:scaling>
+        <c:delete val="0"/>
+        <c:axPos val="l"/>
+        <c:majorGridlines>
+          <c:spPr>
+            <a:ln w="9525" cap="flat" cmpd="sng" algn="ctr">
+              <a:solidFill>
+                <a:schemeClr val="tx1">
+                  <a:lumMod val="15000"/>
+                  <a:lumOff val="85000"/>
+                </a:schemeClr>
+              </a:solidFill>
+              <a:round/>
+            </a:ln>
+            <a:effectLst/>
+          </c:spPr>
+        </c:majorGridlines>
+        <c:numFmt formatCode="General" sourceLinked="1"/>
+        <c:majorTickMark val="none"/>
+        <c:minorTickMark val="none"/>
+        <c:tickLblPos val="nextTo"/>
+        <c:spPr>
+          <a:noFill/>
+          <a:ln>
+            <a:noFill/>
+          </a:ln>
+          <a:effectLst/>
+        </c:spPr>
+        <c:txPr>
+          <a:bodyPr rot="-60000000" spcFirstLastPara="1" vertOverflow="ellipsis" vert="horz" wrap="square" anchor="ctr" anchorCtr="1"/>
+          <a:lstStyle/>
+          <a:p>
+            <a:pPr>
+              <a:defRPr sz="1197" b="0" i="0" u="none" strike="noStrike" kern="1200" baseline="0">
+                <a:solidFill>
+                  <a:schemeClr val="tx1">
+                    <a:lumMod val="65000"/>
+                    <a:lumOff val="35000"/>
+                  </a:schemeClr>
+                </a:solidFill>
+                <a:latin typeface="+mn-lt"/>
+                <a:ea typeface="+mn-ea"/>
+                <a:cs typeface="+mn-cs"/>
+              </a:defRPr>
+            </a:pPr>
+            <a:endParaRPr lang="en-US"/>
+          </a:p>
+        </c:txPr>
+        <c:crossAx val="419657776"/>
+        <c:crosses val="autoZero"/>
+        <c:crossBetween val="between"/>
+      </c:valAx>
+      <c:spPr>
+        <a:noFill/>
+        <a:ln>
+          <a:noFill/>
+        </a:ln>
+        <a:effectLst/>
+      </c:spPr>
+    </c:plotArea>
+    <c:legend>
+      <c:legendPos val="b"/>
+      <c:layout>
+        <c:manualLayout>
+          <c:xMode val="edge"/>
+          <c:yMode val="edge"/>
+          <c:x val="0.20159030511811021"/>
+          <c:y val="0.91219390303925296"/>
+          <c:w val="0.63275688976377953"/>
+          <c:h val="7.3743597825812135E-2"/>
+        </c:manualLayout>
+      </c:layout>
+      <c:overlay val="0"/>
+      <c:spPr>
+        <a:noFill/>
+        <a:ln>
+          <a:noFill/>
+        </a:ln>
+        <a:effectLst/>
+      </c:spPr>
+      <c:txPr>
+        <a:bodyPr rot="0" spcFirstLastPara="1" vertOverflow="ellipsis" vert="horz" wrap="square" anchor="ctr" anchorCtr="1"/>
+        <a:lstStyle/>
+        <a:p>
+          <a:pPr>
+            <a:defRPr sz="1200" b="0" i="0" u="none" strike="noStrike" kern="1200" baseline="0">
+              <a:solidFill>
+                <a:schemeClr val="tx1">
+                  <a:lumMod val="65000"/>
+                  <a:lumOff val="35000"/>
+                </a:schemeClr>
+              </a:solidFill>
+              <a:latin typeface="+mn-lt"/>
+              <a:ea typeface="+mn-ea"/>
+              <a:cs typeface="+mn-cs"/>
+            </a:defRPr>
+          </a:pPr>
+          <a:endParaRPr lang="en-US"/>
+        </a:p>
+      </c:txPr>
+    </c:legend>
+    <c:plotVisOnly val="1"/>
+    <c:dispBlanksAs val="gap"/>
+    <c:extLst>
+      <c:ext xmlns:c16r3="http://schemas.microsoft.com/office/drawing/2017/03/chart" uri="{56B9EC1D-385E-4148-901F-78D8002777C0}">
+        <c16r3:dataDisplayOptions16>
+          <c16r3:dispNaAsBlank val="1"/>
+        </c16r3:dataDisplayOptions16>
+      </c:ext>
+    </c:extLst>
+    <c:showDLblsOverMax val="0"/>
+  </c:chart>
+  <c:spPr>
+    <a:noFill/>
+    <a:ln>
+      <a:noFill/>
+    </a:ln>
+    <a:effectLst/>
+  </c:spPr>
+  <c:txPr>
+    <a:bodyPr/>
+    <a:lstStyle/>
+    <a:p>
+      <a:pPr>
+        <a:defRPr/>
+      </a:pPr>
+      <a:endParaRPr lang="en-US"/>
+    </a:p>
+  </c:txPr>
+  <c:externalData r:id="rId3">
+    <c:autoUpdate val="0"/>
+  </c:externalData>
+</c:chartSpace>
+</file>
+
+<file path=ppt/charts/chart2.xml><?xml version="1.0" encoding="utf-8"?>
+<c:chartSpace xmlns:c="http://schemas.openxmlformats.org/drawingml/2006/chart" xmlns:a="http://schemas.openxmlformats.org/drawingml/2006/main" xmlns:r="http://schemas.openxmlformats.org/officeDocument/2006/relationships" xmlns:c16r2="http://schemas.microsoft.com/office/drawing/2015/06/chart">
+  <c:date1904 val="0"/>
+  <c:lang val="en-US"/>
+  <c:roundedCorners val="0"/>
+  <mc:AlternateContent xmlns:mc="http://schemas.openxmlformats.org/markup-compatibility/2006">
+    <mc:Choice xmlns:c14="http://schemas.microsoft.com/office/drawing/2007/8/2/chart" Requires="c14">
+      <c14:style val="102"/>
+    </mc:Choice>
+    <mc:Fallback>
+      <c:style val="2"/>
+    </mc:Fallback>
+  </mc:AlternateContent>
+  <c:chart>
+    <c:autoTitleDeleted val="0"/>
+    <c:plotArea>
+      <c:layout>
+        <c:manualLayout>
+          <c:layoutTarget val="inner"/>
+          <c:xMode val="edge"/>
+          <c:yMode val="edge"/>
+          <c:x val="5.4711793603321061E-2"/>
+          <c:y val="4.9170506883443051E-2"/>
+          <c:w val="0.91400693780576747"/>
+          <c:h val="0.70123365194074894"/>
+        </c:manualLayout>
+      </c:layout>
+      <c:lineChart>
+        <c:grouping val="standard"/>
+        <c:varyColors val="0"/>
+        <c:ser>
+          <c:idx val="0"/>
+          <c:order val="0"/>
+          <c:tx>
+            <c:strRef>
+              <c:f>Sheet1!$B$1</c:f>
+              <c:strCache>
+                <c:ptCount val="1"/>
+                <c:pt idx="0">
+                  <c:v>Contemporaneous</c:v>
+                </c:pt>
+              </c:strCache>
+            </c:strRef>
+          </c:tx>
+          <c:spPr>
+            <a:ln w="28575" cap="rnd">
+              <a:solidFill>
+                <a:schemeClr val="accent1"/>
+              </a:solidFill>
+              <a:round/>
+            </a:ln>
+            <a:effectLst/>
+          </c:spPr>
+          <c:marker>
+            <c:symbol val="none"/>
+          </c:marker>
+          <c:cat>
+            <c:strRef>
+              <c:f>Sheet1!$A$2:$A$6</c:f>
+              <c:strCache>
+                <c:ptCount val="5"/>
+                <c:pt idx="0">
+                  <c:v>Mon</c:v>
+                </c:pt>
+                <c:pt idx="1">
+                  <c:v>Tue</c:v>
+                </c:pt>
+                <c:pt idx="2">
+                  <c:v>Wed</c:v>
+                </c:pt>
+                <c:pt idx="3">
+                  <c:v>Thur</c:v>
+                </c:pt>
+                <c:pt idx="4">
+                  <c:v>Fri</c:v>
+                </c:pt>
+              </c:strCache>
+            </c:strRef>
+          </c:cat>
+          <c:val>
+            <c:numRef>
+              <c:f>Sheet1!$B$2:$B$6</c:f>
+              <c:numCache>
+                <c:formatCode>General</c:formatCode>
+                <c:ptCount val="5"/>
+                <c:pt idx="0">
+                  <c:v>4.3</c:v>
+                </c:pt>
+                <c:pt idx="1">
+                  <c:v>2.5</c:v>
+                </c:pt>
+                <c:pt idx="2">
+                  <c:v>3.5</c:v>
+                </c:pt>
+                <c:pt idx="3">
+                  <c:v>4.5</c:v>
+                </c:pt>
+              </c:numCache>
+            </c:numRef>
+          </c:val>
+          <c:smooth val="0"/>
+          <c:extLst>
+            <c:ext xmlns:c16="http://schemas.microsoft.com/office/drawing/2014/chart" uri="{C3380CC4-5D6E-409C-BE32-E72D297353CC}">
+              <c16:uniqueId val="{00000000-AC49-4301-BD87-9A471F5F9CBC}"/>
+            </c:ext>
+          </c:extLst>
+        </c:ser>
+        <c:ser>
+          <c:idx val="1"/>
+          <c:order val="1"/>
+          <c:tx>
+            <c:strRef>
+              <c:f>Sheet1!$C$1</c:f>
+              <c:strCache>
+                <c:ptCount val="1"/>
+                <c:pt idx="0">
+                  <c:v>After the fact</c:v>
+                </c:pt>
+              </c:strCache>
+            </c:strRef>
+          </c:tx>
+          <c:spPr>
+            <a:ln w="28575" cap="rnd">
+              <a:solidFill>
+                <a:schemeClr val="accent2"/>
+              </a:solidFill>
+              <a:round/>
+            </a:ln>
+            <a:effectLst/>
+          </c:spPr>
+          <c:marker>
+            <c:symbol val="none"/>
+          </c:marker>
+          <c:cat>
+            <c:strRef>
+              <c:f>Sheet1!$A$2:$A$6</c:f>
+              <c:strCache>
+                <c:ptCount val="5"/>
+                <c:pt idx="0">
+                  <c:v>Mon</c:v>
+                </c:pt>
+                <c:pt idx="1">
+                  <c:v>Tue</c:v>
+                </c:pt>
+                <c:pt idx="2">
+                  <c:v>Wed</c:v>
+                </c:pt>
+                <c:pt idx="3">
+                  <c:v>Thur</c:v>
+                </c:pt>
+                <c:pt idx="4">
+                  <c:v>Fri</c:v>
+                </c:pt>
+              </c:strCache>
+            </c:strRef>
+          </c:cat>
+          <c:val>
+            <c:numRef>
+              <c:f>Sheet1!$C$2:$C$6</c:f>
+              <c:numCache>
+                <c:formatCode>General</c:formatCode>
+                <c:ptCount val="5"/>
+                <c:pt idx="0">
+                  <c:v>3</c:v>
+                </c:pt>
+                <c:pt idx="1">
+                  <c:v>2</c:v>
+                </c:pt>
+                <c:pt idx="2">
+                  <c:v>4</c:v>
+                </c:pt>
+                <c:pt idx="3">
+                  <c:v>5</c:v>
+                </c:pt>
+              </c:numCache>
+            </c:numRef>
+          </c:val>
+          <c:smooth val="0"/>
+          <c:extLst>
+            <c:ext xmlns:c16="http://schemas.microsoft.com/office/drawing/2014/chart" uri="{C3380CC4-5D6E-409C-BE32-E72D297353CC}">
+              <c16:uniqueId val="{00000001-AC49-4301-BD87-9A471F5F9CBC}"/>
+            </c:ext>
+          </c:extLst>
+        </c:ser>
+        <c:dLbls>
+          <c:showLegendKey val="0"/>
+          <c:showVal val="0"/>
+          <c:showCatName val="0"/>
+          <c:showSerName val="0"/>
+          <c:showPercent val="0"/>
+          <c:showBubbleSize val="0"/>
+        </c:dLbls>
+        <c:smooth val="0"/>
+        <c:axId val="419657776"/>
+        <c:axId val="419652200"/>
+      </c:lineChart>
+      <c:catAx>
+        <c:axId val="419657776"/>
+        <c:scaling>
+          <c:orientation val="minMax"/>
+        </c:scaling>
+        <c:delete val="0"/>
+        <c:axPos val="b"/>
+        <c:numFmt formatCode="General" sourceLinked="1"/>
+        <c:majorTickMark val="none"/>
+        <c:minorTickMark val="none"/>
+        <c:tickLblPos val="nextTo"/>
+        <c:spPr>
+          <a:noFill/>
+          <a:ln w="9525" cap="flat" cmpd="sng" algn="ctr">
+            <a:solidFill>
+              <a:schemeClr val="tx1">
+                <a:lumMod val="15000"/>
+                <a:lumOff val="85000"/>
+              </a:schemeClr>
+            </a:solidFill>
+            <a:round/>
+          </a:ln>
+          <a:effectLst/>
+        </c:spPr>
+        <c:txPr>
+          <a:bodyPr rot="-60000000" spcFirstLastPara="1" vertOverflow="ellipsis" vert="horz" wrap="square" anchor="ctr" anchorCtr="1"/>
+          <a:lstStyle/>
+          <a:p>
+            <a:pPr>
+              <a:defRPr sz="1197" b="0" i="0" u="none" strike="noStrike" kern="1200" baseline="0">
+                <a:solidFill>
+                  <a:schemeClr val="tx1">
+                    <a:lumMod val="65000"/>
+                    <a:lumOff val="35000"/>
+                  </a:schemeClr>
+                </a:solidFill>
+                <a:latin typeface="+mn-lt"/>
+                <a:ea typeface="+mn-ea"/>
+                <a:cs typeface="+mn-cs"/>
+              </a:defRPr>
+            </a:pPr>
+            <a:endParaRPr lang="en-US"/>
+          </a:p>
+        </c:txPr>
+        <c:crossAx val="419652200"/>
+        <c:crosses val="autoZero"/>
+        <c:auto val="1"/>
+        <c:lblAlgn val="ctr"/>
+        <c:lblOffset val="100"/>
+        <c:noMultiLvlLbl val="0"/>
+      </c:catAx>
+      <c:valAx>
+        <c:axId val="419652200"/>
+        <c:scaling>
+          <c:orientation val="minMax"/>
+        </c:scaling>
+        <c:delete val="0"/>
+        <c:axPos val="l"/>
+        <c:majorGridlines>
+          <c:spPr>
+            <a:ln w="9525" cap="flat" cmpd="sng" algn="ctr">
+              <a:solidFill>
+                <a:schemeClr val="tx1">
+                  <a:lumMod val="15000"/>
+                  <a:lumOff val="85000"/>
+                </a:schemeClr>
+              </a:solidFill>
+              <a:round/>
+            </a:ln>
+            <a:effectLst/>
+          </c:spPr>
+        </c:majorGridlines>
+        <c:numFmt formatCode="General" sourceLinked="1"/>
+        <c:majorTickMark val="none"/>
+        <c:minorTickMark val="none"/>
+        <c:tickLblPos val="nextTo"/>
+        <c:spPr>
+          <a:noFill/>
+          <a:ln>
+            <a:noFill/>
+          </a:ln>
+          <a:effectLst/>
+        </c:spPr>
+        <c:txPr>
+          <a:bodyPr rot="-60000000" spcFirstLastPara="1" vertOverflow="ellipsis" vert="horz" wrap="square" anchor="ctr" anchorCtr="1"/>
+          <a:lstStyle/>
+          <a:p>
+            <a:pPr>
+              <a:defRPr sz="1197" b="0" i="0" u="none" strike="noStrike" kern="1200" baseline="0">
+                <a:solidFill>
+                  <a:schemeClr val="tx1">
+                    <a:lumMod val="65000"/>
+                    <a:lumOff val="35000"/>
+                  </a:schemeClr>
+                </a:solidFill>
+                <a:latin typeface="+mn-lt"/>
+                <a:ea typeface="+mn-ea"/>
+                <a:cs typeface="+mn-cs"/>
+              </a:defRPr>
+            </a:pPr>
+            <a:endParaRPr lang="en-US"/>
+          </a:p>
+        </c:txPr>
+        <c:crossAx val="419657776"/>
+        <c:crosses val="autoZero"/>
+        <c:crossBetween val="between"/>
+      </c:valAx>
+      <c:spPr>
+        <a:noFill/>
+        <a:ln>
+          <a:noFill/>
+        </a:ln>
+        <a:effectLst/>
+      </c:spPr>
+    </c:plotArea>
+    <c:legend>
+      <c:legendPos val="b"/>
+      <c:layout>
+        <c:manualLayout>
+          <c:xMode val="edge"/>
+          <c:yMode val="edge"/>
+          <c:x val="0.20159030511811021"/>
+          <c:y val="0.91219390303925296"/>
+          <c:w val="0.63453456294069543"/>
+          <c:h val="8.7806036046564187E-2"/>
+        </c:manualLayout>
+      </c:layout>
+      <c:overlay val="0"/>
+      <c:spPr>
+        <a:noFill/>
+        <a:ln>
+          <a:noFill/>
+        </a:ln>
+        <a:effectLst/>
+      </c:spPr>
+      <c:txPr>
+        <a:bodyPr rot="0" spcFirstLastPara="1" vertOverflow="ellipsis" vert="horz" wrap="square" anchor="ctr" anchorCtr="1"/>
+        <a:lstStyle/>
+        <a:p>
+          <a:pPr>
+            <a:defRPr sz="1200" b="0" i="0" u="none" strike="noStrike" kern="1200" baseline="0">
+              <a:solidFill>
+                <a:schemeClr val="tx1">
+                  <a:lumMod val="65000"/>
+                  <a:lumOff val="35000"/>
+                </a:schemeClr>
+              </a:solidFill>
+              <a:latin typeface="+mn-lt"/>
+              <a:ea typeface="+mn-ea"/>
+              <a:cs typeface="+mn-cs"/>
+            </a:defRPr>
+          </a:pPr>
+          <a:endParaRPr lang="en-US"/>
+        </a:p>
+      </c:txPr>
+    </c:legend>
+    <c:plotVisOnly val="1"/>
+    <c:dispBlanksAs val="gap"/>
+    <c:extLst>
+      <c:ext xmlns:c16r3="http://schemas.microsoft.com/office/drawing/2017/03/chart" uri="{56B9EC1D-385E-4148-901F-78D8002777C0}">
+        <c16r3:dataDisplayOptions16>
+          <c16r3:dispNaAsBlank val="1"/>
+        </c16r3:dataDisplayOptions16>
+      </c:ext>
+    </c:extLst>
+    <c:showDLblsOverMax val="0"/>
+  </c:chart>
+  <c:spPr>
+    <a:noFill/>
+    <a:ln>
+      <a:noFill/>
+    </a:ln>
+    <a:effectLst/>
+  </c:spPr>
+  <c:txPr>
+    <a:bodyPr/>
+    <a:lstStyle/>
+    <a:p>
+      <a:pPr>
+        <a:defRPr/>
+      </a:pPr>
+      <a:endParaRPr lang="en-US"/>
+    </a:p>
+  </c:txPr>
+  <c:externalData r:id="rId3">
+    <c:autoUpdate val="0"/>
+  </c:externalData>
+</c:chartSpace>
+</file>
+
+<file path=ppt/charts/colors1.xml><?xml version="1.0" encoding="utf-8"?>
+<cs:colorStyle xmlns:cs="http://schemas.microsoft.com/office/drawing/2012/chartStyle" xmlns:a="http://schemas.openxmlformats.org/drawingml/2006/main" meth="cycle" id="10">
+  <a:schemeClr val="accent1"/>
+  <a:schemeClr val="accent2"/>
+  <a:schemeClr val="accent3"/>
+  <a:schemeClr val="accent4"/>
+  <a:schemeClr val="accent5"/>
+  <a:schemeClr val="accent6"/>
+  <cs:variation/>
+  <cs:variation>
+    <a:lumMod val="60000"/>
+  </cs:variation>
+  <cs:variation>
+    <a:lumMod val="80000"/>
+    <a:lumOff val="20000"/>
+  </cs:variation>
+  <cs:variation>
+    <a:lumMod val="80000"/>
+  </cs:variation>
+  <cs:variation>
+    <a:lumMod val="60000"/>
+    <a:lumOff val="40000"/>
+  </cs:variation>
+  <cs:variation>
+    <a:lumMod val="50000"/>
+  </cs:variation>
+  <cs:variation>
+    <a:lumMod val="70000"/>
+    <a:lumOff val="30000"/>
+  </cs:variation>
+  <cs:variation>
+    <a:lumMod val="70000"/>
+  </cs:variation>
+  <cs:variation>
+    <a:lumMod val="50000"/>
+    <a:lumOff val="50000"/>
+  </cs:variation>
+</cs:colorStyle>
+</file>
+
+<file path=ppt/charts/colors2.xml><?xml version="1.0" encoding="utf-8"?>
+<cs:colorStyle xmlns:cs="http://schemas.microsoft.com/office/drawing/2012/chartStyle" xmlns:a="http://schemas.openxmlformats.org/drawingml/2006/main" meth="cycle" id="10">
+  <a:schemeClr val="accent1"/>
+  <a:schemeClr val="accent2"/>
+  <a:schemeClr val="accent3"/>
+  <a:schemeClr val="accent4"/>
+  <a:schemeClr val="accent5"/>
+  <a:schemeClr val="accent6"/>
+  <cs:variation/>
+  <cs:variation>
+    <a:lumMod val="60000"/>
+  </cs:variation>
+  <cs:variation>
+    <a:lumMod val="80000"/>
+    <a:lumOff val="20000"/>
+  </cs:variation>
+  <cs:variation>
+    <a:lumMod val="80000"/>
+  </cs:variation>
+  <cs:variation>
+    <a:lumMod val="60000"/>
+    <a:lumOff val="40000"/>
+  </cs:variation>
+  <cs:variation>
+    <a:lumMod val="50000"/>
+  </cs:variation>
+  <cs:variation>
+    <a:lumMod val="70000"/>
+    <a:lumOff val="30000"/>
+  </cs:variation>
+  <cs:variation>
+    <a:lumMod val="70000"/>
+  </cs:variation>
+  <cs:variation>
+    <a:lumMod val="50000"/>
+    <a:lumOff val="50000"/>
+  </cs:variation>
+</cs:colorStyle>
+</file>
+
+<file path=ppt/charts/style1.xml><?xml version="1.0" encoding="utf-8"?>
+<cs:chartStyle xmlns:cs="http://schemas.microsoft.com/office/drawing/2012/chartStyle" xmlns:a="http://schemas.openxmlformats.org/drawingml/2006/main" id="201">
+  <cs:axisTitle>
+    <cs:lnRef idx="0"/>
+    <cs:fillRef idx="0"/>
+    <cs:effectRef idx="0"/>
+    <cs:fontRef idx="minor">
+      <a:schemeClr val="tx1">
+        <a:lumMod val="65000"/>
+        <a:lumOff val="35000"/>
+      </a:schemeClr>
+    </cs:fontRef>
+    <cs:defRPr sz="1330" kern="1200"/>
+  </cs:axisTitle>
+  <cs:categoryAxis>
+    <cs:lnRef idx="0"/>
+    <cs:fillRef idx="0"/>
+    <cs:effectRef idx="0"/>
+    <cs:fontRef idx="minor">
+      <a:schemeClr val="tx1">
+        <a:lumMod val="65000"/>
+        <a:lumOff val="35000"/>
+      </a:schemeClr>
+    </cs:fontRef>
+    <cs:spPr>
+      <a:ln w="9525" cap="flat" cmpd="sng" algn="ctr">
+        <a:solidFill>
+          <a:schemeClr val="tx1">
+            <a:lumMod val="15000"/>
+            <a:lumOff val="85000"/>
+          </a:schemeClr>
+        </a:solidFill>
+        <a:round/>
+      </a:ln>
+    </cs:spPr>
+    <cs:defRPr sz="1197" kern="1200"/>
+  </cs:categoryAxis>
+  <cs:chartArea mods="allowNoFillOverride allowNoLineOverride">
+    <cs:lnRef idx="0"/>
+    <cs:fillRef idx="0"/>
+    <cs:effectRef idx="0"/>
+    <cs:fontRef idx="minor">
+      <a:schemeClr val="tx1"/>
+    </cs:fontRef>
+    <cs:spPr>
+      <a:solidFill>
+        <a:schemeClr val="bg1"/>
+      </a:solidFill>
+      <a:ln w="9525" cap="flat" cmpd="sng" algn="ctr">
+        <a:solidFill>
+          <a:schemeClr val="tx1">
+            <a:lumMod val="15000"/>
+            <a:lumOff val="85000"/>
+          </a:schemeClr>
+        </a:solidFill>
+        <a:round/>
+      </a:ln>
+    </cs:spPr>
+    <cs:defRPr sz="1330" kern="1200"/>
+  </cs:chartArea>
+  <cs:dataLabel>
+    <cs:lnRef idx="0"/>
+    <cs:fillRef idx="0"/>
+    <cs:effectRef idx="0"/>
+    <cs:fontRef idx="minor">
+      <a:schemeClr val="tx1">
+        <a:lumMod val="75000"/>
+        <a:lumOff val="25000"/>
+      </a:schemeClr>
+    </cs:fontRef>
+    <cs:defRPr sz="1197" kern="1200"/>
+  </cs:dataLabel>
+  <cs:dataLabelCallout>
+    <cs:lnRef idx="0"/>
+    <cs:fillRef idx="0"/>
+    <cs:effectRef idx="0"/>
+    <cs:fontRef idx="minor">
+      <a:schemeClr val="dk1">
+        <a:lumMod val="65000"/>
+        <a:lumOff val="35000"/>
+      </a:schemeClr>
+    </cs:fontRef>
+    <cs:spPr>
+      <a:solidFill>
+        <a:schemeClr val="lt1"/>
+      </a:solidFill>
+      <a:ln>
+        <a:solidFill>
+          <a:schemeClr val="dk1">
+            <a:lumMod val="25000"/>
+            <a:lumOff val="75000"/>
+          </a:schemeClr>
+        </a:solidFill>
+      </a:ln>
+    </cs:spPr>
+    <cs:defRPr sz="1197" kern="1200"/>
+    <cs:bodyPr rot="0" spcFirstLastPara="1" vertOverflow="clip" horzOverflow="clip" vert="horz" wrap="square" lIns="36576" tIns="18288" rIns="36576" bIns="18288" anchor="ctr" anchorCtr="1">
+      <a:spAutoFit/>
+    </cs:bodyPr>
+  </cs:dataLabelCallout>
+  <cs:dataPoint>
+    <cs:lnRef idx="0"/>
+    <cs:fillRef idx="1">
+      <cs:styleClr val="auto"/>
+    </cs:fillRef>
+    <cs:effectRef idx="0"/>
+    <cs:fontRef idx="minor">
+      <a:schemeClr val="tx1"/>
+    </cs:fontRef>
+  </cs:dataPoint>
+  <cs:dataPoint3D>
+    <cs:lnRef idx="0"/>
+    <cs:fillRef idx="1">
+      <cs:styleClr val="auto"/>
+    </cs:fillRef>
+    <cs:effectRef idx="0"/>
+    <cs:fontRef idx="minor">
+      <a:schemeClr val="tx1"/>
+    </cs:fontRef>
+  </cs:dataPoint3D>
+  <cs:dataPointLine>
+    <cs:lnRef idx="0">
+      <cs:styleClr val="auto"/>
+    </cs:lnRef>
+    <cs:fillRef idx="1"/>
+    <cs:effectRef idx="0"/>
+    <cs:fontRef idx="minor">
+      <a:schemeClr val="tx1"/>
+    </cs:fontRef>
+    <cs:spPr>
+      <a:ln w="28575" cap="rnd">
+        <a:solidFill>
+          <a:schemeClr val="phClr"/>
+        </a:solidFill>
+        <a:round/>
+      </a:ln>
+    </cs:spPr>
+  </cs:dataPointLine>
+  <cs:dataPointMarker>
+    <cs:lnRef idx="0">
+      <cs:styleClr val="auto"/>
+    </cs:lnRef>
+    <cs:fillRef idx="1">
+      <cs:styleClr val="auto"/>
+    </cs:fillRef>
+    <cs:effectRef idx="0"/>
+    <cs:fontRef idx="minor">
+      <a:schemeClr val="tx1"/>
+    </cs:fontRef>
+    <cs:spPr>
+      <a:ln w="9525">
+        <a:solidFill>
+          <a:schemeClr val="phClr"/>
+        </a:solidFill>
+      </a:ln>
+    </cs:spPr>
+  </cs:dataPointMarker>
+  <cs:dataPointMarkerLayout symbol="circle" size="5"/>
+  <cs:dataPointWireframe>
+    <cs:lnRef idx="0">
+      <cs:styleClr val="auto"/>
+    </cs:lnRef>
+    <cs:fillRef idx="1"/>
+    <cs:effectRef idx="0"/>
+    <cs:fontRef idx="minor">
+      <a:schemeClr val="tx1"/>
+    </cs:fontRef>
+    <cs:spPr>
+      <a:ln w="9525" cap="rnd">
+        <a:solidFill>
+          <a:schemeClr val="phClr"/>
+        </a:solidFill>
+        <a:round/>
+      </a:ln>
+    </cs:spPr>
+  </cs:dataPointWireframe>
+  <cs:dataTable>
+    <cs:lnRef idx="0"/>
+    <cs:fillRef idx="0"/>
+    <cs:effectRef idx="0"/>
+    <cs:fontRef idx="minor">
+      <a:schemeClr val="tx1">
+        <a:lumMod val="65000"/>
+        <a:lumOff val="35000"/>
+      </a:schemeClr>
+    </cs:fontRef>
+    <cs:spPr>
+      <a:noFill/>
+      <a:ln w="9525" cap="flat" cmpd="sng" algn="ctr">
+        <a:solidFill>
+          <a:schemeClr val="tx1">
+            <a:lumMod val="15000"/>
+            <a:lumOff val="85000"/>
+          </a:schemeClr>
+        </a:solidFill>
+        <a:round/>
+      </a:ln>
+    </cs:spPr>
+    <cs:defRPr sz="1197" kern="1200"/>
+  </cs:dataTable>
+  <cs:downBar>
+    <cs:lnRef idx="0"/>
+    <cs:fillRef idx="0"/>
+    <cs:effectRef idx="0"/>
+    <cs:fontRef idx="minor">
+      <a:schemeClr val="dk1"/>
+    </cs:fontRef>
+    <cs:spPr>
+      <a:solidFill>
+        <a:schemeClr val="dk1">
+          <a:lumMod val="65000"/>
+          <a:lumOff val="35000"/>
+        </a:schemeClr>
+      </a:solidFill>
+      <a:ln w="9525">
+        <a:solidFill>
+          <a:schemeClr val="tx1">
+            <a:lumMod val="65000"/>
+            <a:lumOff val="35000"/>
+          </a:schemeClr>
+        </a:solidFill>
+      </a:ln>
+    </cs:spPr>
+  </cs:downBar>
+  <cs:dropLine>
+    <cs:lnRef idx="0"/>
+    <cs:fillRef idx="0"/>
+    <cs:effectRef idx="0"/>
+    <cs:fontRef idx="minor">
+      <a:schemeClr val="tx1"/>
+    </cs:fontRef>
+    <cs:spPr>
+      <a:ln w="9525" cap="flat" cmpd="sng" algn="ctr">
+        <a:solidFill>
+          <a:schemeClr val="tx1">
+            <a:lumMod val="35000"/>
+            <a:lumOff val="65000"/>
+          </a:schemeClr>
+        </a:solidFill>
+        <a:round/>
+      </a:ln>
+    </cs:spPr>
+  </cs:dropLine>
+  <cs:errorBar>
+    <cs:lnRef idx="0"/>
+    <cs:fillRef idx="0"/>
+    <cs:effectRef idx="0"/>
+    <cs:fontRef idx="minor">
+      <a:schemeClr val="tx1"/>
+    </cs:fontRef>
+    <cs:spPr>
+      <a:ln w="9525" cap="flat" cmpd="sng" algn="ctr">
+        <a:solidFill>
+          <a:schemeClr val="tx1">
+            <a:lumMod val="65000"/>
+            <a:lumOff val="35000"/>
+          </a:schemeClr>
+        </a:solidFill>
+        <a:round/>
+      </a:ln>
+    </cs:spPr>
+  </cs:errorBar>
+  <cs:floor>
+    <cs:lnRef idx="0"/>
+    <cs:fillRef idx="0"/>
+    <cs:effectRef idx="0"/>
+    <cs:fontRef idx="minor">
+      <a:schemeClr val="tx1"/>
+    </cs:fontRef>
+    <cs:spPr>
+      <a:noFill/>
+      <a:ln>
+        <a:noFill/>
+      </a:ln>
+    </cs:spPr>
+  </cs:floor>
+  <cs:gridlineMajor>
+    <cs:lnRef idx="0"/>
+    <cs:fillRef idx="0"/>
+    <cs:effectRef idx="0"/>
+    <cs:fontRef idx="minor">
+      <a:schemeClr val="tx1"/>
+    </cs:fontRef>
+    <cs:spPr>
+      <a:ln w="9525" cap="flat" cmpd="sng" algn="ctr">
+        <a:solidFill>
+          <a:schemeClr val="tx1">
+            <a:lumMod val="15000"/>
+            <a:lumOff val="85000"/>
+          </a:schemeClr>
+        </a:solidFill>
+        <a:round/>
+      </a:ln>
+    </cs:spPr>
+  </cs:gridlineMajor>
+  <cs:gridlineMinor>
+    <cs:lnRef idx="0"/>
+    <cs:fillRef idx="0"/>
+    <cs:effectRef idx="0"/>
+    <cs:fontRef idx="minor">
+      <a:schemeClr val="tx1"/>
+    </cs:fontRef>
+    <cs:spPr>
+      <a:ln w="9525" cap="flat" cmpd="sng" algn="ctr">
+        <a:solidFill>
+          <a:schemeClr val="tx1">
+            <a:lumMod val="5000"/>
+            <a:lumOff val="95000"/>
+          </a:schemeClr>
+        </a:solidFill>
+        <a:round/>
+      </a:ln>
+    </cs:spPr>
+  </cs:gridlineMinor>
+  <cs:hiLoLine>
+    <cs:lnRef idx="0"/>
+    <cs:fillRef idx="0"/>
+    <cs:effectRef idx="0"/>
+    <cs:fontRef idx="minor">
+      <a:schemeClr val="tx1"/>
+    </cs:fontRef>
+    <cs:spPr>
+      <a:ln w="9525" cap="flat" cmpd="sng" algn="ctr">
+        <a:solidFill>
+          <a:schemeClr val="tx1">
+            <a:lumMod val="75000"/>
+            <a:lumOff val="25000"/>
+          </a:schemeClr>
+        </a:solidFill>
+        <a:round/>
+      </a:ln>
+    </cs:spPr>
+  </cs:hiLoLine>
+  <cs:leaderLine>
+    <cs:lnRef idx="0"/>
+    <cs:fillRef idx="0"/>
+    <cs:effectRef idx="0"/>
+    <cs:fontRef idx="minor">
+      <a:schemeClr val="tx1"/>
+    </cs:fontRef>
+    <cs:spPr>
+      <a:ln w="9525" cap="flat" cmpd="sng" algn="ctr">
+        <a:solidFill>
+          <a:schemeClr val="tx1">
+            <a:lumMod val="35000"/>
+            <a:lumOff val="65000"/>
+          </a:schemeClr>
+        </a:solidFill>
+        <a:round/>
+      </a:ln>
+    </cs:spPr>
+  </cs:leaderLine>
+  <cs:legend>
+    <cs:lnRef idx="0"/>
+    <cs:fillRef idx="0"/>
+    <cs:effectRef idx="0"/>
+    <cs:fontRef idx="minor">
+      <a:schemeClr val="tx1">
+        <a:lumMod val="65000"/>
+        <a:lumOff val="35000"/>
+      </a:schemeClr>
+    </cs:fontRef>
+    <cs:defRPr sz="1197" kern="1200"/>
+  </cs:legend>
+  <cs:plotArea mods="allowNoFillOverride allowNoLineOverride">
+    <cs:lnRef idx="0"/>
+    <cs:fillRef idx="0"/>
+    <cs:effectRef idx="0"/>
+    <cs:fontRef idx="minor">
+      <a:schemeClr val="tx1"/>
+    </cs:fontRef>
+  </cs:plotArea>
+  <cs:plotArea3D mods="allowNoFillOverride allowNoLineOverride">
+    <cs:lnRef idx="0"/>
+    <cs:fillRef idx="0"/>
+    <cs:effectRef idx="0"/>
+    <cs:fontRef idx="minor">
+      <a:schemeClr val="tx1"/>
+    </cs:fontRef>
+  </cs:plotArea3D>
+  <cs:seriesAxis>
+    <cs:lnRef idx="0"/>
+    <cs:fillRef idx="0"/>
+    <cs:effectRef idx="0"/>
+    <cs:fontRef idx="minor">
+      <a:schemeClr val="tx1">
+        <a:lumMod val="65000"/>
+        <a:lumOff val="35000"/>
+      </a:schemeClr>
+    </cs:fontRef>
+    <cs:defRPr sz="1197" kern="1200"/>
+  </cs:seriesAxis>
+  <cs:seriesLine>
+    <cs:lnRef idx="0"/>
+    <cs:fillRef idx="0"/>
+    <cs:effectRef idx="0"/>
+    <cs:fontRef idx="minor">
+      <a:schemeClr val="tx1"/>
+    </cs:fontRef>
+    <cs:spPr>
+      <a:ln w="9525" cap="flat" cmpd="sng" algn="ctr">
+        <a:solidFill>
+          <a:schemeClr val="tx1">
+            <a:lumMod val="35000"/>
+            <a:lumOff val="65000"/>
+          </a:schemeClr>
+        </a:solidFill>
+        <a:round/>
+      </a:ln>
+    </cs:spPr>
+  </cs:seriesLine>
+  <cs:title>
+    <cs:lnRef idx="0"/>
+    <cs:fillRef idx="0"/>
+    <cs:effectRef idx="0"/>
+    <cs:fontRef idx="minor">
+      <a:schemeClr val="tx1">
+        <a:lumMod val="65000"/>
+        <a:lumOff val="35000"/>
+      </a:schemeClr>
+    </cs:fontRef>
+    <cs:defRPr sz="1862" b="0" kern="1200" spc="0" baseline="0"/>
+  </cs:title>
+  <cs:trendline>
+    <cs:lnRef idx="0">
+      <cs:styleClr val="auto"/>
+    </cs:lnRef>
+    <cs:fillRef idx="0"/>
+    <cs:effectRef idx="0"/>
+    <cs:fontRef idx="minor">
+      <a:schemeClr val="tx1"/>
+    </cs:fontRef>
+    <cs:spPr>
+      <a:ln w="19050" cap="rnd">
+        <a:solidFill>
+          <a:schemeClr val="phClr"/>
+        </a:solidFill>
+        <a:prstDash val="sysDot"/>
+      </a:ln>
+    </cs:spPr>
+  </cs:trendline>
+  <cs:trendlineLabel>
+    <cs:lnRef idx="0"/>
+    <cs:fillRef idx="0"/>
+    <cs:effectRef idx="0"/>
+    <cs:fontRef idx="minor">
+      <a:schemeClr val="tx1">
+        <a:lumMod val="65000"/>
+        <a:lumOff val="35000"/>
+      </a:schemeClr>
+    </cs:fontRef>
+    <cs:defRPr sz="1197" kern="1200"/>
+  </cs:trendlineLabel>
+  <cs:upBar>
+    <cs:lnRef idx="0"/>
+    <cs:fillRef idx="0"/>
+    <cs:effectRef idx="0"/>
+    <cs:fontRef idx="minor">
+      <a:schemeClr val="dk1"/>
+    </cs:fontRef>
+    <cs:spPr>
+      <a:solidFill>
+        <a:schemeClr val="lt1"/>
+      </a:solidFill>
+      <a:ln w="9525">
+        <a:solidFill>
+          <a:schemeClr val="tx1">
+            <a:lumMod val="15000"/>
+            <a:lumOff val="85000"/>
+          </a:schemeClr>
+        </a:solidFill>
+      </a:ln>
+    </cs:spPr>
+  </cs:upBar>
+  <cs:valueAxis>
+    <cs:lnRef idx="0"/>
+    <cs:fillRef idx="0"/>
+    <cs:effectRef idx="0"/>
+    <cs:fontRef idx="minor">
+      <a:schemeClr val="tx1">
+        <a:lumMod val="65000"/>
+        <a:lumOff val="35000"/>
+      </a:schemeClr>
+    </cs:fontRef>
+    <cs:defRPr sz="1197" kern="1200"/>
+  </cs:valueAxis>
+  <cs:wall>
+    <cs:lnRef idx="0"/>
+    <cs:fillRef idx="0"/>
+    <cs:effectRef idx="0"/>
+    <cs:fontRef idx="minor">
+      <a:schemeClr val="tx1"/>
+    </cs:fontRef>
+    <cs:spPr>
+      <a:noFill/>
+      <a:ln>
+        <a:noFill/>
+      </a:ln>
+    </cs:spPr>
+  </cs:wall>
+</cs:chartStyle>
+</file>
+
+<file path=ppt/charts/style2.xml><?xml version="1.0" encoding="utf-8"?>
+<cs:chartStyle xmlns:cs="http://schemas.microsoft.com/office/drawing/2012/chartStyle" xmlns:a="http://schemas.openxmlformats.org/drawingml/2006/main" id="201">
+  <cs:axisTitle>
+    <cs:lnRef idx="0"/>
+    <cs:fillRef idx="0"/>
+    <cs:effectRef idx="0"/>
+    <cs:fontRef idx="minor">
+      <a:schemeClr val="tx1">
+        <a:lumMod val="65000"/>
+        <a:lumOff val="35000"/>
+      </a:schemeClr>
+    </cs:fontRef>
+    <cs:defRPr sz="1330" kern="1200"/>
+  </cs:axisTitle>
+  <cs:categoryAxis>
+    <cs:lnRef idx="0"/>
+    <cs:fillRef idx="0"/>
+    <cs:effectRef idx="0"/>
+    <cs:fontRef idx="minor">
+      <a:schemeClr val="tx1">
+        <a:lumMod val="65000"/>
+        <a:lumOff val="35000"/>
+      </a:schemeClr>
+    </cs:fontRef>
+    <cs:spPr>
+      <a:ln w="9525" cap="flat" cmpd="sng" algn="ctr">
+        <a:solidFill>
+          <a:schemeClr val="tx1">
+            <a:lumMod val="15000"/>
+            <a:lumOff val="85000"/>
+          </a:schemeClr>
+        </a:solidFill>
+        <a:round/>
+      </a:ln>
+    </cs:spPr>
+    <cs:defRPr sz="1197" kern="1200"/>
+  </cs:categoryAxis>
+  <cs:chartArea mods="allowNoFillOverride allowNoLineOverride">
+    <cs:lnRef idx="0"/>
+    <cs:fillRef idx="0"/>
+    <cs:effectRef idx="0"/>
+    <cs:fontRef idx="minor">
+      <a:schemeClr val="tx1"/>
+    </cs:fontRef>
+    <cs:spPr>
+      <a:solidFill>
+        <a:schemeClr val="bg1"/>
+      </a:solidFill>
+      <a:ln w="9525" cap="flat" cmpd="sng" algn="ctr">
+        <a:solidFill>
+          <a:schemeClr val="tx1">
+            <a:lumMod val="15000"/>
+            <a:lumOff val="85000"/>
+          </a:schemeClr>
+        </a:solidFill>
+        <a:round/>
+      </a:ln>
+    </cs:spPr>
+    <cs:defRPr sz="1330" kern="1200"/>
+  </cs:chartArea>
+  <cs:dataLabel>
+    <cs:lnRef idx="0"/>
+    <cs:fillRef idx="0"/>
+    <cs:effectRef idx="0"/>
+    <cs:fontRef idx="minor">
+      <a:schemeClr val="tx1">
+        <a:lumMod val="75000"/>
+        <a:lumOff val="25000"/>
+      </a:schemeClr>
+    </cs:fontRef>
+    <cs:defRPr sz="1197" kern="1200"/>
+  </cs:dataLabel>
+  <cs:dataLabelCallout>
+    <cs:lnRef idx="0"/>
+    <cs:fillRef idx="0"/>
+    <cs:effectRef idx="0"/>
+    <cs:fontRef idx="minor">
+      <a:schemeClr val="dk1">
+        <a:lumMod val="65000"/>
+        <a:lumOff val="35000"/>
+      </a:schemeClr>
+    </cs:fontRef>
+    <cs:spPr>
+      <a:solidFill>
+        <a:schemeClr val="lt1"/>
+      </a:solidFill>
+      <a:ln>
+        <a:solidFill>
+          <a:schemeClr val="dk1">
+            <a:lumMod val="25000"/>
+            <a:lumOff val="75000"/>
+          </a:schemeClr>
+        </a:solidFill>
+      </a:ln>
+    </cs:spPr>
+    <cs:defRPr sz="1197" kern="1200"/>
+    <cs:bodyPr rot="0" spcFirstLastPara="1" vertOverflow="clip" horzOverflow="clip" vert="horz" wrap="square" lIns="36576" tIns="18288" rIns="36576" bIns="18288" anchor="ctr" anchorCtr="1">
+      <a:spAutoFit/>
+    </cs:bodyPr>
+  </cs:dataLabelCallout>
+  <cs:dataPoint>
+    <cs:lnRef idx="0"/>
+    <cs:fillRef idx="1">
+      <cs:styleClr val="auto"/>
+    </cs:fillRef>
+    <cs:effectRef idx="0"/>
+    <cs:fontRef idx="minor">
+      <a:schemeClr val="tx1"/>
+    </cs:fontRef>
+  </cs:dataPoint>
+  <cs:dataPoint3D>
+    <cs:lnRef idx="0"/>
+    <cs:fillRef idx="1">
+      <cs:styleClr val="auto"/>
+    </cs:fillRef>
+    <cs:effectRef idx="0"/>
+    <cs:fontRef idx="minor">
+      <a:schemeClr val="tx1"/>
+    </cs:fontRef>
+  </cs:dataPoint3D>
+  <cs:dataPointLine>
+    <cs:lnRef idx="0">
+      <cs:styleClr val="auto"/>
+    </cs:lnRef>
+    <cs:fillRef idx="1"/>
+    <cs:effectRef idx="0"/>
+    <cs:fontRef idx="minor">
+      <a:schemeClr val="tx1"/>
+    </cs:fontRef>
+    <cs:spPr>
+      <a:ln w="28575" cap="rnd">
+        <a:solidFill>
+          <a:schemeClr val="phClr"/>
+        </a:solidFill>
+        <a:round/>
+      </a:ln>
+    </cs:spPr>
+  </cs:dataPointLine>
+  <cs:dataPointMarker>
+    <cs:lnRef idx="0">
+      <cs:styleClr val="auto"/>
+    </cs:lnRef>
+    <cs:fillRef idx="1">
+      <cs:styleClr val="auto"/>
+    </cs:fillRef>
+    <cs:effectRef idx="0"/>
+    <cs:fontRef idx="minor">
+      <a:schemeClr val="tx1"/>
+    </cs:fontRef>
+    <cs:spPr>
+      <a:ln w="9525">
+        <a:solidFill>
+          <a:schemeClr val="phClr"/>
+        </a:solidFill>
+      </a:ln>
+    </cs:spPr>
+  </cs:dataPointMarker>
+  <cs:dataPointMarkerLayout symbol="circle" size="5"/>
+  <cs:dataPointWireframe>
+    <cs:lnRef idx="0">
+      <cs:styleClr val="auto"/>
+    </cs:lnRef>
+    <cs:fillRef idx="1"/>
+    <cs:effectRef idx="0"/>
+    <cs:fontRef idx="minor">
+      <a:schemeClr val="tx1"/>
+    </cs:fontRef>
+    <cs:spPr>
+      <a:ln w="9525" cap="rnd">
+        <a:solidFill>
+          <a:schemeClr val="phClr"/>
+        </a:solidFill>
+        <a:round/>
+      </a:ln>
+    </cs:spPr>
+  </cs:dataPointWireframe>
+  <cs:dataTable>
+    <cs:lnRef idx="0"/>
+    <cs:fillRef idx="0"/>
+    <cs:effectRef idx="0"/>
+    <cs:fontRef idx="minor">
+      <a:schemeClr val="tx1">
+        <a:lumMod val="65000"/>
+        <a:lumOff val="35000"/>
+      </a:schemeClr>
+    </cs:fontRef>
+    <cs:spPr>
+      <a:noFill/>
+      <a:ln w="9525" cap="flat" cmpd="sng" algn="ctr">
+        <a:solidFill>
+          <a:schemeClr val="tx1">
+            <a:lumMod val="15000"/>
+            <a:lumOff val="85000"/>
+          </a:schemeClr>
+        </a:solidFill>
+        <a:round/>
+      </a:ln>
+    </cs:spPr>
+    <cs:defRPr sz="1197" kern="1200"/>
+  </cs:dataTable>
+  <cs:downBar>
+    <cs:lnRef idx="0"/>
+    <cs:fillRef idx="0"/>
+    <cs:effectRef idx="0"/>
+    <cs:fontRef idx="minor">
+      <a:schemeClr val="dk1"/>
+    </cs:fontRef>
+    <cs:spPr>
+      <a:solidFill>
+        <a:schemeClr val="dk1">
+          <a:lumMod val="65000"/>
+          <a:lumOff val="35000"/>
+        </a:schemeClr>
+      </a:solidFill>
+      <a:ln w="9525">
+        <a:solidFill>
+          <a:schemeClr val="tx1">
+            <a:lumMod val="65000"/>
+            <a:lumOff val="35000"/>
+          </a:schemeClr>
+        </a:solidFill>
+      </a:ln>
+    </cs:spPr>
+  </cs:downBar>
+  <cs:dropLine>
+    <cs:lnRef idx="0"/>
+    <cs:fillRef idx="0"/>
+    <cs:effectRef idx="0"/>
+    <cs:fontRef idx="minor">
+      <a:schemeClr val="tx1"/>
+    </cs:fontRef>
+    <cs:spPr>
+      <a:ln w="9525" cap="flat" cmpd="sng" algn="ctr">
+        <a:solidFill>
+          <a:schemeClr val="tx1">
+            <a:lumMod val="35000"/>
+            <a:lumOff val="65000"/>
+          </a:schemeClr>
+        </a:solidFill>
+        <a:round/>
+      </a:ln>
+    </cs:spPr>
+  </cs:dropLine>
+  <cs:errorBar>
+    <cs:lnRef idx="0"/>
+    <cs:fillRef idx="0"/>
+    <cs:effectRef idx="0"/>
+    <cs:fontRef idx="minor">
+      <a:schemeClr val="tx1"/>
+    </cs:fontRef>
+    <cs:spPr>
+      <a:ln w="9525" cap="flat" cmpd="sng" algn="ctr">
+        <a:solidFill>
+          <a:schemeClr val="tx1">
+            <a:lumMod val="65000"/>
+            <a:lumOff val="35000"/>
+          </a:schemeClr>
+        </a:solidFill>
+        <a:round/>
+      </a:ln>
+    </cs:spPr>
+  </cs:errorBar>
+  <cs:floor>
+    <cs:lnRef idx="0"/>
+    <cs:fillRef idx="0"/>
+    <cs:effectRef idx="0"/>
+    <cs:fontRef idx="minor">
+      <a:schemeClr val="tx1"/>
+    </cs:fontRef>
+    <cs:spPr>
+      <a:noFill/>
+      <a:ln>
+        <a:noFill/>
+      </a:ln>
+    </cs:spPr>
+  </cs:floor>
+  <cs:gridlineMajor>
+    <cs:lnRef idx="0"/>
+    <cs:fillRef idx="0"/>
+    <cs:effectRef idx="0"/>
+    <cs:fontRef idx="minor">
+      <a:schemeClr val="tx1"/>
+    </cs:fontRef>
+    <cs:spPr>
+      <a:ln w="9525" cap="flat" cmpd="sng" algn="ctr">
+        <a:solidFill>
+          <a:schemeClr val="tx1">
+            <a:lumMod val="15000"/>
+            <a:lumOff val="85000"/>
+          </a:schemeClr>
+        </a:solidFill>
+        <a:round/>
+      </a:ln>
+    </cs:spPr>
+  </cs:gridlineMajor>
+  <cs:gridlineMinor>
+    <cs:lnRef idx="0"/>
+    <cs:fillRef idx="0"/>
+    <cs:effectRef idx="0"/>
+    <cs:fontRef idx="minor">
+      <a:schemeClr val="tx1"/>
+    </cs:fontRef>
+    <cs:spPr>
+      <a:ln w="9525" cap="flat" cmpd="sng" algn="ctr">
+        <a:solidFill>
+          <a:schemeClr val="tx1">
+            <a:lumMod val="5000"/>
+            <a:lumOff val="95000"/>
+          </a:schemeClr>
+        </a:solidFill>
+        <a:round/>
+      </a:ln>
+    </cs:spPr>
+  </cs:gridlineMinor>
+  <cs:hiLoLine>
+    <cs:lnRef idx="0"/>
+    <cs:fillRef idx="0"/>
+    <cs:effectRef idx="0"/>
+    <cs:fontRef idx="minor">
+      <a:schemeClr val="tx1"/>
+    </cs:fontRef>
+    <cs:spPr>
+      <a:ln w="9525" cap="flat" cmpd="sng" algn="ctr">
+        <a:solidFill>
+          <a:schemeClr val="tx1">
+            <a:lumMod val="75000"/>
+            <a:lumOff val="25000"/>
+          </a:schemeClr>
+        </a:solidFill>
+        <a:round/>
+      </a:ln>
+    </cs:spPr>
+  </cs:hiLoLine>
+  <cs:leaderLine>
+    <cs:lnRef idx="0"/>
+    <cs:fillRef idx="0"/>
+    <cs:effectRef idx="0"/>
+    <cs:fontRef idx="minor">
+      <a:schemeClr val="tx1"/>
+    </cs:fontRef>
+    <cs:spPr>
+      <a:ln w="9525" cap="flat" cmpd="sng" algn="ctr">
+        <a:solidFill>
+          <a:schemeClr val="tx1">
+            <a:lumMod val="35000"/>
+            <a:lumOff val="65000"/>
+          </a:schemeClr>
+        </a:solidFill>
+        <a:round/>
+      </a:ln>
+    </cs:spPr>
+  </cs:leaderLine>
+  <cs:legend>
+    <cs:lnRef idx="0"/>
+    <cs:fillRef idx="0"/>
+    <cs:effectRef idx="0"/>
+    <cs:fontRef idx="minor">
+      <a:schemeClr val="tx1">
+        <a:lumMod val="65000"/>
+        <a:lumOff val="35000"/>
+      </a:schemeClr>
+    </cs:fontRef>
+    <cs:defRPr sz="1197" kern="1200"/>
+  </cs:legend>
+  <cs:plotArea mods="allowNoFillOverride allowNoLineOverride">
+    <cs:lnRef idx="0"/>
+    <cs:fillRef idx="0"/>
+    <cs:effectRef idx="0"/>
+    <cs:fontRef idx="minor">
+      <a:schemeClr val="tx1"/>
+    </cs:fontRef>
+  </cs:plotArea>
+  <cs:plotArea3D mods="allowNoFillOverride allowNoLineOverride">
+    <cs:lnRef idx="0"/>
+    <cs:fillRef idx="0"/>
+    <cs:effectRef idx="0"/>
+    <cs:fontRef idx="minor">
+      <a:schemeClr val="tx1"/>
+    </cs:fontRef>
+  </cs:plotArea3D>
+  <cs:seriesAxis>
+    <cs:lnRef idx="0"/>
+    <cs:fillRef idx="0"/>
+    <cs:effectRef idx="0"/>
+    <cs:fontRef idx="minor">
+      <a:schemeClr val="tx1">
+        <a:lumMod val="65000"/>
+        <a:lumOff val="35000"/>
+      </a:schemeClr>
+    </cs:fontRef>
+    <cs:defRPr sz="1197" kern="1200"/>
+  </cs:seriesAxis>
+  <cs:seriesLine>
+    <cs:lnRef idx="0"/>
+    <cs:fillRef idx="0"/>
+    <cs:effectRef idx="0"/>
+    <cs:fontRef idx="minor">
+      <a:schemeClr val="tx1"/>
+    </cs:fontRef>
+    <cs:spPr>
+      <a:ln w="9525" cap="flat" cmpd="sng" algn="ctr">
+        <a:solidFill>
+          <a:schemeClr val="tx1">
+            <a:lumMod val="35000"/>
+            <a:lumOff val="65000"/>
+          </a:schemeClr>
+        </a:solidFill>
+        <a:round/>
+      </a:ln>
+    </cs:spPr>
+  </cs:seriesLine>
+  <cs:title>
+    <cs:lnRef idx="0"/>
+    <cs:fillRef idx="0"/>
+    <cs:effectRef idx="0"/>
+    <cs:fontRef idx="minor">
+      <a:schemeClr val="tx1">
+        <a:lumMod val="65000"/>
+        <a:lumOff val="35000"/>
+      </a:schemeClr>
+    </cs:fontRef>
+    <cs:defRPr sz="1862" b="0" kern="1200" spc="0" baseline="0"/>
+  </cs:title>
+  <cs:trendline>
+    <cs:lnRef idx="0">
+      <cs:styleClr val="auto"/>
+    </cs:lnRef>
+    <cs:fillRef idx="0"/>
+    <cs:effectRef idx="0"/>
+    <cs:fontRef idx="minor">
+      <a:schemeClr val="tx1"/>
+    </cs:fontRef>
+    <cs:spPr>
+      <a:ln w="19050" cap="rnd">
+        <a:solidFill>
+          <a:schemeClr val="phClr"/>
+        </a:solidFill>
+        <a:prstDash val="sysDot"/>
+      </a:ln>
+    </cs:spPr>
+  </cs:trendline>
+  <cs:trendlineLabel>
+    <cs:lnRef idx="0"/>
+    <cs:fillRef idx="0"/>
+    <cs:effectRef idx="0"/>
+    <cs:fontRef idx="minor">
+      <a:schemeClr val="tx1">
+        <a:lumMod val="65000"/>
+        <a:lumOff val="35000"/>
+      </a:schemeClr>
+    </cs:fontRef>
+    <cs:defRPr sz="1197" kern="1200"/>
+  </cs:trendlineLabel>
+  <cs:upBar>
+    <cs:lnRef idx="0"/>
+    <cs:fillRef idx="0"/>
+    <cs:effectRef idx="0"/>
+    <cs:fontRef idx="minor">
+      <a:schemeClr val="dk1"/>
+    </cs:fontRef>
+    <cs:spPr>
+      <a:solidFill>
+        <a:schemeClr val="lt1"/>
+      </a:solidFill>
+      <a:ln w="9525">
+        <a:solidFill>
+          <a:schemeClr val="tx1">
+            <a:lumMod val="15000"/>
+            <a:lumOff val="85000"/>
+          </a:schemeClr>
+        </a:solidFill>
+      </a:ln>
+    </cs:spPr>
+  </cs:upBar>
+  <cs:valueAxis>
+    <cs:lnRef idx="0"/>
+    <cs:fillRef idx="0"/>
+    <cs:effectRef idx="0"/>
+    <cs:fontRef idx="minor">
+      <a:schemeClr val="tx1">
+        <a:lumMod val="65000"/>
+        <a:lumOff val="35000"/>
+      </a:schemeClr>
+    </cs:fontRef>
+    <cs:defRPr sz="1197" kern="1200"/>
+  </cs:valueAxis>
+  <cs:wall>
+    <cs:lnRef idx="0"/>
+    <cs:fillRef idx="0"/>
+    <cs:effectRef idx="0"/>
+    <cs:fontRef idx="minor">
+      <a:schemeClr val="tx1"/>
+    </cs:fontRef>
+    <cs:spPr>
+      <a:noFill/>
+      <a:ln>
+        <a:noFill/>
+      </a:ln>
+    </cs:spPr>
+  </cs:wall>
+</cs:chartStyle>
+</file>
+
 <file path=ppt/slideLayouts/slideLayout1.xml><?xml version="1.0" encoding="utf-8"?>
 <p:sldLayout xmlns:a="http://schemas.openxmlformats.org/drawingml/2006/main" xmlns:r="http://schemas.openxmlformats.org/officeDocument/2006/relationships" xmlns:p="http://schemas.openxmlformats.org/presentationml/2006/main" type="title" preserve="1">
   <p:cSld name="Title Slide">
@@ -260,7 +2115,7 @@
           <a:p>
             <a:fld id="{E9005B36-101B-445A-8BDF-8403D2480BD0}" type="datetimeFigureOut">
               <a:rPr lang="en-US" smtClean="0"/>
-              <a:t>2/3/2020</a:t>
+              <a:t>2/5/2020</a:t>
             </a:fld>
             <a:endParaRPr lang="en-US"/>
           </a:p>
@@ -458,7 +2313,7 @@
           <a:p>
             <a:fld id="{E9005B36-101B-445A-8BDF-8403D2480BD0}" type="datetimeFigureOut">
               <a:rPr lang="en-US" smtClean="0"/>
-              <a:t>2/3/2020</a:t>
+              <a:t>2/5/2020</a:t>
             </a:fld>
             <a:endParaRPr lang="en-US"/>
           </a:p>
@@ -666,7 +2521,7 @@
           <a:p>
             <a:fld id="{E9005B36-101B-445A-8BDF-8403D2480BD0}" type="datetimeFigureOut">
               <a:rPr lang="en-US" smtClean="0"/>
-              <a:t>2/3/2020</a:t>
+              <a:t>2/5/2020</a:t>
             </a:fld>
             <a:endParaRPr lang="en-US"/>
           </a:p>
@@ -864,7 +2719,7 @@
           <a:p>
             <a:fld id="{E9005B36-101B-445A-8BDF-8403D2480BD0}" type="datetimeFigureOut">
               <a:rPr lang="en-US" smtClean="0"/>
-              <a:t>2/3/2020</a:t>
+              <a:t>2/5/2020</a:t>
             </a:fld>
             <a:endParaRPr lang="en-US"/>
           </a:p>
@@ -1139,7 +2994,7 @@
           <a:p>
             <a:fld id="{E9005B36-101B-445A-8BDF-8403D2480BD0}" type="datetimeFigureOut">
               <a:rPr lang="en-US" smtClean="0"/>
-              <a:t>2/3/2020</a:t>
+              <a:t>2/5/2020</a:t>
             </a:fld>
             <a:endParaRPr lang="en-US"/>
           </a:p>
@@ -1404,7 +3259,7 @@
           <a:p>
             <a:fld id="{E9005B36-101B-445A-8BDF-8403D2480BD0}" type="datetimeFigureOut">
               <a:rPr lang="en-US" smtClean="0"/>
-              <a:t>2/3/2020</a:t>
+              <a:t>2/5/2020</a:t>
             </a:fld>
             <a:endParaRPr lang="en-US"/>
           </a:p>
@@ -1816,7 +3671,7 @@
           <a:p>
             <a:fld id="{E9005B36-101B-445A-8BDF-8403D2480BD0}" type="datetimeFigureOut">
               <a:rPr lang="en-US" smtClean="0"/>
-              <a:t>2/3/2020</a:t>
+              <a:t>2/5/2020</a:t>
             </a:fld>
             <a:endParaRPr lang="en-US"/>
           </a:p>
@@ -1957,7 +3812,7 @@
           <a:p>
             <a:fld id="{E9005B36-101B-445A-8BDF-8403D2480BD0}" type="datetimeFigureOut">
               <a:rPr lang="en-US" smtClean="0"/>
-              <a:t>2/3/2020</a:t>
+              <a:t>2/5/2020</a:t>
             </a:fld>
             <a:endParaRPr lang="en-US"/>
           </a:p>
@@ -2070,7 +3925,7 @@
           <a:p>
             <a:fld id="{E9005B36-101B-445A-8BDF-8403D2480BD0}" type="datetimeFigureOut">
               <a:rPr lang="en-US" smtClean="0"/>
-              <a:t>2/3/2020</a:t>
+              <a:t>2/5/2020</a:t>
             </a:fld>
             <a:endParaRPr lang="en-US"/>
           </a:p>
@@ -2381,7 +4236,7 @@
           <a:p>
             <a:fld id="{E9005B36-101B-445A-8BDF-8403D2480BD0}" type="datetimeFigureOut">
               <a:rPr lang="en-US" smtClean="0"/>
-              <a:t>2/3/2020</a:t>
+              <a:t>2/5/2020</a:t>
             </a:fld>
             <a:endParaRPr lang="en-US"/>
           </a:p>
@@ -2669,7 +4524,7 @@
           <a:p>
             <a:fld id="{E9005B36-101B-445A-8BDF-8403D2480BD0}" type="datetimeFigureOut">
               <a:rPr lang="en-US" smtClean="0"/>
-              <a:t>2/3/2020</a:t>
+              <a:t>2/5/2020</a:t>
             </a:fld>
             <a:endParaRPr lang="en-US"/>
           </a:p>
@@ -2910,7 +4765,7 @@
           <a:p>
             <a:fld id="{E9005B36-101B-445A-8BDF-8403D2480BD0}" type="datetimeFigureOut">
               <a:rPr lang="en-US" smtClean="0"/>
-              <a:t>2/3/2020</a:t>
+              <a:t>2/5/2020</a:t>
             </a:fld>
             <a:endParaRPr lang="en-US"/>
           </a:p>
@@ -6960,6 +8815,764 @@
 </p:sld>
 </file>
 
+<file path=ppt/slides/slide3.xml><?xml version="1.0" encoding="utf-8"?>
+<p:sld xmlns:a="http://schemas.openxmlformats.org/drawingml/2006/main" xmlns:r="http://schemas.openxmlformats.org/officeDocument/2006/relationships" xmlns:p="http://schemas.openxmlformats.org/presentationml/2006/main">
+  <p:cSld>
+    <p:spTree>
+      <p:nvGrpSpPr>
+        <p:cNvPr id="1" name=""/>
+        <p:cNvGrpSpPr/>
+        <p:nvPr/>
+      </p:nvGrpSpPr>
+      <p:grpSpPr>
+        <a:xfrm>
+          <a:off x="0" y="0"/>
+          <a:ext cx="0" cy="0"/>
+          <a:chOff x="0" y="0"/>
+          <a:chExt cx="0" cy="0"/>
+        </a:xfrm>
+      </p:grpSpPr>
+      <p:graphicFrame>
+        <p:nvGraphicFramePr>
+          <p:cNvPr id="6" name="Chart 5">
+            <a:extLst>
+              <a:ext uri="{FF2B5EF4-FFF2-40B4-BE49-F238E27FC236}">
+                <a16:creationId xmlns:a16="http://schemas.microsoft.com/office/drawing/2014/main" id="{7BFDA6C2-E1F2-471E-8B2E-56E0344877DC}"/>
+              </a:ext>
+            </a:extLst>
+          </p:cNvPr>
+          <p:cNvGraphicFramePr/>
+          <p:nvPr>
+            <p:extLst/>
+          </p:nvPr>
+        </p:nvGraphicFramePr>
+        <p:xfrm>
+          <a:off x="1617302" y="2260571"/>
+          <a:ext cx="4894679" cy="2455879"/>
+        </p:xfrm>
+        <a:graphic>
+          <a:graphicData uri="http://schemas.openxmlformats.org/drawingml/2006/chart">
+            <c:chart xmlns:c="http://schemas.openxmlformats.org/drawingml/2006/chart" xmlns:r="http://schemas.openxmlformats.org/officeDocument/2006/relationships" r:id="rId2"/>
+          </a:graphicData>
+        </a:graphic>
+      </p:graphicFrame>
+      <p:cxnSp>
+        <p:nvCxnSpPr>
+          <p:cNvPr id="8" name="Straight Connector 7">
+            <a:extLst>
+              <a:ext uri="{FF2B5EF4-FFF2-40B4-BE49-F238E27FC236}">
+                <a16:creationId xmlns:a16="http://schemas.microsoft.com/office/drawing/2014/main" id="{5C9D6784-715C-47F5-A5C7-9D81D22F213A}"/>
+              </a:ext>
+            </a:extLst>
+          </p:cNvPr>
+          <p:cNvCxnSpPr>
+            <a:cxnSpLocks/>
+            <a:stCxn id="10" idx="2"/>
+            <a:endCxn id="9" idx="6"/>
+          </p:cNvCxnSpPr>
+          <p:nvPr/>
+        </p:nvCxnSpPr>
+        <p:spPr>
+          <a:xfrm>
+            <a:off x="1979719" y="791427"/>
+            <a:ext cx="1618608" cy="737"/>
+          </a:xfrm>
+          <a:prstGeom prst="line">
+            <a:avLst/>
+          </a:prstGeom>
+        </p:spPr>
+        <p:style>
+          <a:lnRef idx="1">
+            <a:schemeClr val="accent1"/>
+          </a:lnRef>
+          <a:fillRef idx="0">
+            <a:schemeClr val="accent1"/>
+          </a:fillRef>
+          <a:effectRef idx="0">
+            <a:schemeClr val="accent1"/>
+          </a:effectRef>
+          <a:fontRef idx="minor">
+            <a:schemeClr val="tx1"/>
+          </a:fontRef>
+        </p:style>
+      </p:cxnSp>
+      <p:sp>
+        <p:nvSpPr>
+          <p:cNvPr id="9" name="Oval 8">
+            <a:extLst>
+              <a:ext uri="{FF2B5EF4-FFF2-40B4-BE49-F238E27FC236}">
+                <a16:creationId xmlns:a16="http://schemas.microsoft.com/office/drawing/2014/main" id="{32152F27-0214-41A5-B0DC-0DFE1B3B06B9}"/>
+              </a:ext>
+            </a:extLst>
+          </p:cNvPr>
+          <p:cNvSpPr/>
+          <p:nvPr/>
+        </p:nvSpPr>
+        <p:spPr>
+          <a:xfrm flipH="1">
+            <a:off x="3598327" y="703387"/>
+            <a:ext cx="191949" cy="177553"/>
+          </a:xfrm>
+          <a:prstGeom prst="ellipse">
+            <a:avLst/>
+          </a:prstGeom>
+        </p:spPr>
+        <p:style>
+          <a:lnRef idx="2">
+            <a:schemeClr val="accent1">
+              <a:shade val="50000"/>
+            </a:schemeClr>
+          </a:lnRef>
+          <a:fillRef idx="1">
+            <a:schemeClr val="accent1"/>
+          </a:fillRef>
+          <a:effectRef idx="0">
+            <a:schemeClr val="accent1"/>
+          </a:effectRef>
+          <a:fontRef idx="minor">
+            <a:schemeClr val="lt1"/>
+          </a:fontRef>
+        </p:style>
+        <p:txBody>
+          <a:bodyPr rtlCol="0" anchor="ctr"/>
+          <a:lstStyle/>
+          <a:p>
+            <a:pPr algn="ctr"/>
+            <a:endParaRPr lang="en-US"/>
+          </a:p>
+        </p:txBody>
+      </p:sp>
+      <p:sp>
+        <p:nvSpPr>
+          <p:cNvPr id="10" name="Oval 9">
+            <a:extLst>
+              <a:ext uri="{FF2B5EF4-FFF2-40B4-BE49-F238E27FC236}">
+                <a16:creationId xmlns:a16="http://schemas.microsoft.com/office/drawing/2014/main" id="{F32B1035-59FE-45B3-B329-50CB6D17FA59}"/>
+              </a:ext>
+            </a:extLst>
+          </p:cNvPr>
+          <p:cNvSpPr/>
+          <p:nvPr/>
+        </p:nvSpPr>
+        <p:spPr>
+          <a:xfrm flipH="1">
+            <a:off x="1787770" y="702650"/>
+            <a:ext cx="191949" cy="177553"/>
+          </a:xfrm>
+          <a:prstGeom prst="ellipse">
+            <a:avLst/>
+          </a:prstGeom>
+        </p:spPr>
+        <p:style>
+          <a:lnRef idx="2">
+            <a:schemeClr val="accent1">
+              <a:shade val="50000"/>
+            </a:schemeClr>
+          </a:lnRef>
+          <a:fillRef idx="1">
+            <a:schemeClr val="accent1"/>
+          </a:fillRef>
+          <a:effectRef idx="0">
+            <a:schemeClr val="accent1"/>
+          </a:effectRef>
+          <a:fontRef idx="minor">
+            <a:schemeClr val="lt1"/>
+          </a:fontRef>
+        </p:style>
+        <p:txBody>
+          <a:bodyPr rtlCol="0" anchor="ctr"/>
+          <a:lstStyle/>
+          <a:p>
+            <a:pPr algn="ctr"/>
+            <a:endParaRPr lang="en-US"/>
+          </a:p>
+        </p:txBody>
+      </p:sp>
+      <p:sp>
+        <p:nvSpPr>
+          <p:cNvPr id="15" name="TextBox 14">
+            <a:extLst>
+              <a:ext uri="{FF2B5EF4-FFF2-40B4-BE49-F238E27FC236}">
+                <a16:creationId xmlns:a16="http://schemas.microsoft.com/office/drawing/2014/main" id="{40D7DB30-BFBF-49AC-817A-6C4F10AB0F5C}"/>
+              </a:ext>
+            </a:extLst>
+          </p:cNvPr>
+          <p:cNvSpPr txBox="1"/>
+          <p:nvPr/>
+        </p:nvSpPr>
+        <p:spPr>
+          <a:xfrm>
+            <a:off x="505168" y="606760"/>
+            <a:ext cx="665247" cy="369332"/>
+          </a:xfrm>
+          <a:prstGeom prst="rect">
+            <a:avLst/>
+          </a:prstGeom>
+          <a:noFill/>
+        </p:spPr>
+        <p:txBody>
+          <a:bodyPr wrap="none" rtlCol="0">
+            <a:spAutoFit/>
+          </a:bodyPr>
+          <a:lstStyle/>
+          <a:p>
+            <a:r>
+              <a:rPr lang="en-US" dirty="0"/>
+              <a:t>Scale</a:t>
+            </a:r>
+          </a:p>
+        </p:txBody>
+      </p:sp>
+      <p:cxnSp>
+        <p:nvCxnSpPr>
+          <p:cNvPr id="19" name="Straight Connector 18">
+            <a:extLst>
+              <a:ext uri="{FF2B5EF4-FFF2-40B4-BE49-F238E27FC236}">
+                <a16:creationId xmlns:a16="http://schemas.microsoft.com/office/drawing/2014/main" id="{BA75B11C-98F4-45C4-9F3B-67FC72E09385}"/>
+              </a:ext>
+            </a:extLst>
+          </p:cNvPr>
+          <p:cNvCxnSpPr>
+            <a:cxnSpLocks/>
+            <a:stCxn id="21" idx="2"/>
+            <a:endCxn id="20" idx="6"/>
+          </p:cNvCxnSpPr>
+          <p:nvPr/>
+        </p:nvCxnSpPr>
+        <p:spPr>
+          <a:xfrm>
+            <a:off x="1979719" y="1284876"/>
+            <a:ext cx="1618608" cy="737"/>
+          </a:xfrm>
+          <a:prstGeom prst="line">
+            <a:avLst/>
+          </a:prstGeom>
+        </p:spPr>
+        <p:style>
+          <a:lnRef idx="1">
+            <a:schemeClr val="accent1"/>
+          </a:lnRef>
+          <a:fillRef idx="0">
+            <a:schemeClr val="accent1"/>
+          </a:fillRef>
+          <a:effectRef idx="0">
+            <a:schemeClr val="accent1"/>
+          </a:effectRef>
+          <a:fontRef idx="minor">
+            <a:schemeClr val="tx1"/>
+          </a:fontRef>
+        </p:style>
+      </p:cxnSp>
+      <p:sp>
+        <p:nvSpPr>
+          <p:cNvPr id="20" name="Oval 19">
+            <a:extLst>
+              <a:ext uri="{FF2B5EF4-FFF2-40B4-BE49-F238E27FC236}">
+                <a16:creationId xmlns:a16="http://schemas.microsoft.com/office/drawing/2014/main" id="{AA3D3886-3B36-47F1-BA0A-820C7C7BA318}"/>
+              </a:ext>
+            </a:extLst>
+          </p:cNvPr>
+          <p:cNvSpPr/>
+          <p:nvPr/>
+        </p:nvSpPr>
+        <p:spPr>
+          <a:xfrm flipH="1">
+            <a:off x="3598327" y="1196836"/>
+            <a:ext cx="191949" cy="177553"/>
+          </a:xfrm>
+          <a:prstGeom prst="ellipse">
+            <a:avLst/>
+          </a:prstGeom>
+        </p:spPr>
+        <p:style>
+          <a:lnRef idx="2">
+            <a:schemeClr val="accent1">
+              <a:shade val="50000"/>
+            </a:schemeClr>
+          </a:lnRef>
+          <a:fillRef idx="1">
+            <a:schemeClr val="accent1"/>
+          </a:fillRef>
+          <a:effectRef idx="0">
+            <a:schemeClr val="accent1"/>
+          </a:effectRef>
+          <a:fontRef idx="minor">
+            <a:schemeClr val="lt1"/>
+          </a:fontRef>
+        </p:style>
+        <p:txBody>
+          <a:bodyPr rtlCol="0" anchor="ctr"/>
+          <a:lstStyle/>
+          <a:p>
+            <a:pPr algn="ctr"/>
+            <a:endParaRPr lang="en-US"/>
+          </a:p>
+        </p:txBody>
+      </p:sp>
+      <p:sp>
+        <p:nvSpPr>
+          <p:cNvPr id="21" name="Oval 20">
+            <a:extLst>
+              <a:ext uri="{FF2B5EF4-FFF2-40B4-BE49-F238E27FC236}">
+                <a16:creationId xmlns:a16="http://schemas.microsoft.com/office/drawing/2014/main" id="{E4658C12-E5CF-4C96-B6BA-A1F18A32797B}"/>
+              </a:ext>
+            </a:extLst>
+          </p:cNvPr>
+          <p:cNvSpPr/>
+          <p:nvPr/>
+        </p:nvSpPr>
+        <p:spPr>
+          <a:xfrm flipH="1">
+            <a:off x="1787770" y="1196099"/>
+            <a:ext cx="191949" cy="177553"/>
+          </a:xfrm>
+          <a:prstGeom prst="ellipse">
+            <a:avLst/>
+          </a:prstGeom>
+        </p:spPr>
+        <p:style>
+          <a:lnRef idx="2">
+            <a:schemeClr val="accent1">
+              <a:shade val="50000"/>
+            </a:schemeClr>
+          </a:lnRef>
+          <a:fillRef idx="1">
+            <a:schemeClr val="accent1"/>
+          </a:fillRef>
+          <a:effectRef idx="0">
+            <a:schemeClr val="accent1"/>
+          </a:effectRef>
+          <a:fontRef idx="minor">
+            <a:schemeClr val="lt1"/>
+          </a:fontRef>
+        </p:style>
+        <p:txBody>
+          <a:bodyPr rtlCol="0" anchor="ctr"/>
+          <a:lstStyle/>
+          <a:p>
+            <a:pPr algn="ctr"/>
+            <a:endParaRPr lang="en-US"/>
+          </a:p>
+        </p:txBody>
+      </p:sp>
+      <p:sp>
+        <p:nvSpPr>
+          <p:cNvPr id="22" name="TextBox 21">
+            <a:extLst>
+              <a:ext uri="{FF2B5EF4-FFF2-40B4-BE49-F238E27FC236}">
+                <a16:creationId xmlns:a16="http://schemas.microsoft.com/office/drawing/2014/main" id="{BFA2C5E2-F1AB-4EDA-A5DF-5E91FE15A041}"/>
+              </a:ext>
+            </a:extLst>
+          </p:cNvPr>
+          <p:cNvSpPr txBox="1"/>
+          <p:nvPr/>
+        </p:nvSpPr>
+        <p:spPr>
+          <a:xfrm>
+            <a:off x="431871" y="1091503"/>
+            <a:ext cx="1180901" cy="369332"/>
+          </a:xfrm>
+          <a:prstGeom prst="rect">
+            <a:avLst/>
+          </a:prstGeom>
+          <a:noFill/>
+        </p:spPr>
+        <p:txBody>
+          <a:bodyPr wrap="none" rtlCol="0">
+            <a:spAutoFit/>
+          </a:bodyPr>
+          <a:lstStyle/>
+          <a:p>
+            <a:r>
+              <a:rPr lang="en-US" dirty="0">
+                <a:highlight>
+                  <a:srgbClr val="FFFF00"/>
+                </a:highlight>
+              </a:rPr>
+              <a:t>Resolution</a:t>
+            </a:r>
+          </a:p>
+        </p:txBody>
+      </p:sp>
+      <p:sp>
+        <p:nvSpPr>
+          <p:cNvPr id="23" name="TextBox 22">
+            <a:extLst>
+              <a:ext uri="{FF2B5EF4-FFF2-40B4-BE49-F238E27FC236}">
+                <a16:creationId xmlns:a16="http://schemas.microsoft.com/office/drawing/2014/main" id="{49319B59-F64D-42BF-920F-A8D5F529C150}"/>
+              </a:ext>
+            </a:extLst>
+          </p:cNvPr>
+          <p:cNvSpPr txBox="1"/>
+          <p:nvPr/>
+        </p:nvSpPr>
+        <p:spPr>
+          <a:xfrm>
+            <a:off x="4064642" y="598907"/>
+            <a:ext cx="4062715" cy="369332"/>
+          </a:xfrm>
+          <a:prstGeom prst="rect">
+            <a:avLst/>
+          </a:prstGeom>
+          <a:noFill/>
+        </p:spPr>
+        <p:txBody>
+          <a:bodyPr wrap="none" rtlCol="0">
+            <a:spAutoFit/>
+          </a:bodyPr>
+          <a:lstStyle/>
+          <a:p>
+            <a:r>
+              <a:rPr lang="en-US" dirty="0"/>
+              <a:t>(Today, Yesterday, This week, This Month)</a:t>
+            </a:r>
+          </a:p>
+        </p:txBody>
+      </p:sp>
+      <p:sp>
+        <p:nvSpPr>
+          <p:cNvPr id="24" name="TextBox 23">
+            <a:extLst>
+              <a:ext uri="{FF2B5EF4-FFF2-40B4-BE49-F238E27FC236}">
+                <a16:creationId xmlns:a16="http://schemas.microsoft.com/office/drawing/2014/main" id="{719F5F54-5CC1-4F10-B49E-5EC82461E83E}"/>
+              </a:ext>
+            </a:extLst>
+          </p:cNvPr>
+          <p:cNvSpPr txBox="1"/>
+          <p:nvPr/>
+        </p:nvSpPr>
+        <p:spPr>
+          <a:xfrm>
+            <a:off x="4064642" y="1100209"/>
+            <a:ext cx="2998898" cy="369332"/>
+          </a:xfrm>
+          <a:prstGeom prst="rect">
+            <a:avLst/>
+          </a:prstGeom>
+          <a:noFill/>
+        </p:spPr>
+        <p:txBody>
+          <a:bodyPr wrap="none" rtlCol="0">
+            <a:spAutoFit/>
+          </a:bodyPr>
+          <a:lstStyle/>
+          <a:p>
+            <a:r>
+              <a:rPr lang="en-US" dirty="0"/>
+              <a:t>(Hours, Days, Weeks, Months)</a:t>
+            </a:r>
+          </a:p>
+        </p:txBody>
+      </p:sp>
+      <p:sp>
+        <p:nvSpPr>
+          <p:cNvPr id="25" name="TextBox 24">
+            <a:extLst>
+              <a:ext uri="{FF2B5EF4-FFF2-40B4-BE49-F238E27FC236}">
+                <a16:creationId xmlns:a16="http://schemas.microsoft.com/office/drawing/2014/main" id="{AD793BFC-A8C6-4426-BEE9-296D19B0CB64}"/>
+              </a:ext>
+            </a:extLst>
+          </p:cNvPr>
+          <p:cNvSpPr txBox="1"/>
+          <p:nvPr/>
+        </p:nvSpPr>
+        <p:spPr>
+          <a:xfrm>
+            <a:off x="282678" y="5516186"/>
+            <a:ext cx="1180901" cy="369332"/>
+          </a:xfrm>
+          <a:prstGeom prst="rect">
+            <a:avLst/>
+          </a:prstGeom>
+          <a:noFill/>
+        </p:spPr>
+        <p:txBody>
+          <a:bodyPr wrap="none" rtlCol="0">
+            <a:spAutoFit/>
+          </a:bodyPr>
+          <a:lstStyle/>
+          <a:p>
+            <a:r>
+              <a:rPr lang="en-US" dirty="0">
+                <a:highlight>
+                  <a:srgbClr val="FFFF00"/>
+                </a:highlight>
+              </a:rPr>
+              <a:t>Resolution</a:t>
+            </a:r>
+          </a:p>
+        </p:txBody>
+      </p:sp>
+      <p:sp>
+        <p:nvSpPr>
+          <p:cNvPr id="26" name="TextBox 25">
+            <a:extLst>
+              <a:ext uri="{FF2B5EF4-FFF2-40B4-BE49-F238E27FC236}">
+                <a16:creationId xmlns:a16="http://schemas.microsoft.com/office/drawing/2014/main" id="{338DB448-FF0B-4BBC-A840-94DC45F0C528}"/>
+              </a:ext>
+            </a:extLst>
+          </p:cNvPr>
+          <p:cNvSpPr txBox="1"/>
+          <p:nvPr/>
+        </p:nvSpPr>
+        <p:spPr>
+          <a:xfrm>
+            <a:off x="2148269" y="5239187"/>
+            <a:ext cx="4554372" cy="923330"/>
+          </a:xfrm>
+          <a:prstGeom prst="rect">
+            <a:avLst/>
+          </a:prstGeom>
+          <a:noFill/>
+        </p:spPr>
+        <p:txBody>
+          <a:bodyPr wrap="square" rtlCol="0">
+            <a:spAutoFit/>
+          </a:bodyPr>
+          <a:lstStyle/>
+          <a:p>
+            <a:r>
+              <a:rPr lang="en-US" dirty="0"/>
+              <a:t>Mon	Tue	Wed	Thu	Fri</a:t>
+            </a:r>
+          </a:p>
+          <a:p>
+            <a:r>
+              <a:rPr lang="en-US" dirty="0" err="1"/>
+              <a:t>Wk</a:t>
+            </a:r>
+            <a:r>
+              <a:rPr lang="en-US" dirty="0"/>
+              <a:t> 5	</a:t>
+            </a:r>
+            <a:r>
+              <a:rPr lang="en-US" dirty="0" err="1"/>
+              <a:t>Wk</a:t>
+            </a:r>
+            <a:r>
+              <a:rPr lang="en-US" dirty="0"/>
+              <a:t> 6	</a:t>
+            </a:r>
+            <a:r>
+              <a:rPr lang="en-US" dirty="0" err="1"/>
+              <a:t>Wk</a:t>
+            </a:r>
+            <a:r>
+              <a:rPr lang="en-US" dirty="0"/>
+              <a:t> 8	</a:t>
+            </a:r>
+            <a:r>
+              <a:rPr lang="en-US" dirty="0" err="1"/>
+              <a:t>Wk</a:t>
+            </a:r>
+            <a:r>
+              <a:rPr lang="en-US" dirty="0"/>
+              <a:t> 8	</a:t>
+            </a:r>
+            <a:r>
+              <a:rPr lang="en-US" dirty="0" err="1"/>
+              <a:t>Wk</a:t>
+            </a:r>
+            <a:r>
+              <a:rPr lang="en-US" dirty="0"/>
+              <a:t> 9</a:t>
+            </a:r>
+          </a:p>
+          <a:p>
+            <a:r>
+              <a:rPr lang="en-US" dirty="0"/>
+              <a:t>Jan	Feb	Mar	Apr	May</a:t>
+            </a:r>
+          </a:p>
+        </p:txBody>
+      </p:sp>
+      <p:sp>
+        <p:nvSpPr>
+          <p:cNvPr id="27" name="Rectangle: Rounded Corners 26">
+            <a:extLst>
+              <a:ext uri="{FF2B5EF4-FFF2-40B4-BE49-F238E27FC236}">
+                <a16:creationId xmlns:a16="http://schemas.microsoft.com/office/drawing/2014/main" id="{FECD92ED-D8AD-4EB8-90D0-F04D09B79626}"/>
+              </a:ext>
+            </a:extLst>
+          </p:cNvPr>
+          <p:cNvSpPr/>
+          <p:nvPr/>
+        </p:nvSpPr>
+        <p:spPr>
+          <a:xfrm>
+            <a:off x="9195391" y="702652"/>
+            <a:ext cx="511995" cy="177552"/>
+          </a:xfrm>
+          <a:prstGeom prst="roundRect">
+            <a:avLst/>
+          </a:prstGeom>
+          <a:solidFill>
+            <a:schemeClr val="bg1"/>
+          </a:solidFill>
+          <a:ln w="19050" cap="rnd">
+            <a:round/>
+          </a:ln>
+        </p:spPr>
+        <p:style>
+          <a:lnRef idx="2">
+            <a:schemeClr val="accent1">
+              <a:shade val="50000"/>
+            </a:schemeClr>
+          </a:lnRef>
+          <a:fillRef idx="1">
+            <a:schemeClr val="accent1"/>
+          </a:fillRef>
+          <a:effectRef idx="0">
+            <a:schemeClr val="accent1"/>
+          </a:effectRef>
+          <a:fontRef idx="minor">
+            <a:schemeClr val="lt1"/>
+          </a:fontRef>
+        </p:style>
+        <p:txBody>
+          <a:bodyPr rtlCol="0" anchor="ctr"/>
+          <a:lstStyle/>
+          <a:p>
+            <a:pPr algn="ctr"/>
+            <a:endParaRPr lang="en-US"/>
+          </a:p>
+        </p:txBody>
+      </p:sp>
+      <p:sp>
+        <p:nvSpPr>
+          <p:cNvPr id="28" name="Oval 27">
+            <a:extLst>
+              <a:ext uri="{FF2B5EF4-FFF2-40B4-BE49-F238E27FC236}">
+                <a16:creationId xmlns:a16="http://schemas.microsoft.com/office/drawing/2014/main" id="{8404D4A0-54B4-4B9C-A963-FD7880E2DE62}"/>
+              </a:ext>
+            </a:extLst>
+          </p:cNvPr>
+          <p:cNvSpPr/>
+          <p:nvPr/>
+        </p:nvSpPr>
+        <p:spPr>
+          <a:xfrm flipH="1">
+            <a:off x="9259440" y="702651"/>
+            <a:ext cx="191949" cy="177553"/>
+          </a:xfrm>
+          <a:prstGeom prst="ellipse">
+            <a:avLst/>
+          </a:prstGeom>
+          <a:solidFill>
+            <a:schemeClr val="bg2">
+              <a:lumMod val="50000"/>
+            </a:schemeClr>
+          </a:solidFill>
+          <a:ln>
+            <a:solidFill>
+              <a:schemeClr val="tx1">
+                <a:lumMod val="65000"/>
+                <a:lumOff val="35000"/>
+              </a:schemeClr>
+            </a:solidFill>
+          </a:ln>
+        </p:spPr>
+        <p:style>
+          <a:lnRef idx="2">
+            <a:schemeClr val="accent1">
+              <a:shade val="50000"/>
+            </a:schemeClr>
+          </a:lnRef>
+          <a:fillRef idx="1">
+            <a:schemeClr val="accent1"/>
+          </a:fillRef>
+          <a:effectRef idx="0">
+            <a:schemeClr val="accent1"/>
+          </a:effectRef>
+          <a:fontRef idx="minor">
+            <a:schemeClr val="lt1"/>
+          </a:fontRef>
+        </p:style>
+        <p:txBody>
+          <a:bodyPr rtlCol="0" anchor="ctr"/>
+          <a:lstStyle/>
+          <a:p>
+            <a:pPr algn="ctr"/>
+            <a:endParaRPr lang="en-US"/>
+          </a:p>
+        </p:txBody>
+      </p:sp>
+      <p:sp>
+        <p:nvSpPr>
+          <p:cNvPr id="29" name="TextBox 28">
+            <a:extLst>
+              <a:ext uri="{FF2B5EF4-FFF2-40B4-BE49-F238E27FC236}">
+                <a16:creationId xmlns:a16="http://schemas.microsoft.com/office/drawing/2014/main" id="{046BF6E1-9199-48D1-B16E-5526C1CCC8F2}"/>
+              </a:ext>
+            </a:extLst>
+          </p:cNvPr>
+          <p:cNvSpPr txBox="1"/>
+          <p:nvPr/>
+        </p:nvSpPr>
+        <p:spPr>
+          <a:xfrm>
+            <a:off x="9771434" y="606761"/>
+            <a:ext cx="1250150" cy="369332"/>
+          </a:xfrm>
+          <a:prstGeom prst="rect">
+            <a:avLst/>
+          </a:prstGeom>
+          <a:noFill/>
+        </p:spPr>
+        <p:txBody>
+          <a:bodyPr wrap="none" rtlCol="0">
+            <a:spAutoFit/>
+          </a:bodyPr>
+          <a:lstStyle/>
+          <a:p>
+            <a:r>
+              <a:rPr lang="en-US" dirty="0"/>
+              <a:t>Count/Sum</a:t>
+            </a:r>
+          </a:p>
+        </p:txBody>
+      </p:sp>
+      <p:graphicFrame>
+        <p:nvGraphicFramePr>
+          <p:cNvPr id="18" name="Chart 17">
+            <a:extLst>
+              <a:ext uri="{FF2B5EF4-FFF2-40B4-BE49-F238E27FC236}">
+                <a16:creationId xmlns:a16="http://schemas.microsoft.com/office/drawing/2014/main" id="{C8F2C519-26CE-4FD4-B7ED-4B0B25EFBE06}"/>
+              </a:ext>
+            </a:extLst>
+          </p:cNvPr>
+          <p:cNvGraphicFramePr/>
+          <p:nvPr>
+            <p:extLst>
+              <p:ext uri="{D42A27DB-BD31-4B8C-83A1-F6EECF244321}">
+                <p14:modId xmlns:p14="http://schemas.microsoft.com/office/powerpoint/2010/main" val="3675501049"/>
+              </p:ext>
+            </p:extLst>
+          </p:nvPr>
+        </p:nvGraphicFramePr>
+        <p:xfrm>
+          <a:off x="6812100" y="2262978"/>
+          <a:ext cx="4894679" cy="2455879"/>
+        </p:xfrm>
+        <a:graphic>
+          <a:graphicData uri="http://schemas.openxmlformats.org/drawingml/2006/chart">
+            <c:chart xmlns:c="http://schemas.openxmlformats.org/drawingml/2006/chart" xmlns:r="http://schemas.openxmlformats.org/officeDocument/2006/relationships" r:id="rId3"/>
+          </a:graphicData>
+        </a:graphic>
+      </p:graphicFrame>
+    </p:spTree>
+    <p:extLst>
+      <p:ext uri="{BB962C8B-B14F-4D97-AF65-F5344CB8AC3E}">
+        <p14:creationId xmlns:p14="http://schemas.microsoft.com/office/powerpoint/2010/main" val="2937232086"/>
+      </p:ext>
+    </p:extLst>
+  </p:cSld>
+  <p:clrMapOvr>
+    <a:masterClrMapping/>
+  </p:clrMapOvr>
+</p:sld>
+</file>
+
 <file path=ppt/theme/theme1.xml><?xml version="1.0" encoding="utf-8"?>
 <a:theme xmlns:a="http://schemas.openxmlformats.org/drawingml/2006/main" name="Office Theme">
   <a:themeElements>

</xml_diff>

<commit_message>
Including a few other updates
Update Github smart link rule
Add spanish date labels
Update getProjects code to prevent crash when no item is selected on pivot change.
</commit_message>
<xml_diff>
--- a/Function Map.pptx
+++ b/Function Map.pptx
@@ -2115,7 +2115,7 @@
           <a:p>
             <a:fld id="{E9005B36-101B-445A-8BDF-8403D2480BD0}" type="datetimeFigureOut">
               <a:rPr lang="en-US" smtClean="0"/>
-              <a:t>2/5/2020</a:t>
+              <a:t>2/6/2020</a:t>
             </a:fld>
             <a:endParaRPr lang="en-US"/>
           </a:p>
@@ -2313,7 +2313,7 @@
           <a:p>
             <a:fld id="{E9005B36-101B-445A-8BDF-8403D2480BD0}" type="datetimeFigureOut">
               <a:rPr lang="en-US" smtClean="0"/>
-              <a:t>2/5/2020</a:t>
+              <a:t>2/6/2020</a:t>
             </a:fld>
             <a:endParaRPr lang="en-US"/>
           </a:p>
@@ -2521,7 +2521,7 @@
           <a:p>
             <a:fld id="{E9005B36-101B-445A-8BDF-8403D2480BD0}" type="datetimeFigureOut">
               <a:rPr lang="en-US" smtClean="0"/>
-              <a:t>2/5/2020</a:t>
+              <a:t>2/6/2020</a:t>
             </a:fld>
             <a:endParaRPr lang="en-US"/>
           </a:p>
@@ -2719,7 +2719,7 @@
           <a:p>
             <a:fld id="{E9005B36-101B-445A-8BDF-8403D2480BD0}" type="datetimeFigureOut">
               <a:rPr lang="en-US" smtClean="0"/>
-              <a:t>2/5/2020</a:t>
+              <a:t>2/6/2020</a:t>
             </a:fld>
             <a:endParaRPr lang="en-US"/>
           </a:p>
@@ -2994,7 +2994,7 @@
           <a:p>
             <a:fld id="{E9005B36-101B-445A-8BDF-8403D2480BD0}" type="datetimeFigureOut">
               <a:rPr lang="en-US" smtClean="0"/>
-              <a:t>2/5/2020</a:t>
+              <a:t>2/6/2020</a:t>
             </a:fld>
             <a:endParaRPr lang="en-US"/>
           </a:p>
@@ -3259,7 +3259,7 @@
           <a:p>
             <a:fld id="{E9005B36-101B-445A-8BDF-8403D2480BD0}" type="datetimeFigureOut">
               <a:rPr lang="en-US" smtClean="0"/>
-              <a:t>2/5/2020</a:t>
+              <a:t>2/6/2020</a:t>
             </a:fld>
             <a:endParaRPr lang="en-US"/>
           </a:p>
@@ -3671,7 +3671,7 @@
           <a:p>
             <a:fld id="{E9005B36-101B-445A-8BDF-8403D2480BD0}" type="datetimeFigureOut">
               <a:rPr lang="en-US" smtClean="0"/>
-              <a:t>2/5/2020</a:t>
+              <a:t>2/6/2020</a:t>
             </a:fld>
             <a:endParaRPr lang="en-US"/>
           </a:p>
@@ -3812,7 +3812,7 @@
           <a:p>
             <a:fld id="{E9005B36-101B-445A-8BDF-8403D2480BD0}" type="datetimeFigureOut">
               <a:rPr lang="en-US" smtClean="0"/>
-              <a:t>2/5/2020</a:t>
+              <a:t>2/6/2020</a:t>
             </a:fld>
             <a:endParaRPr lang="en-US"/>
           </a:p>
@@ -3925,7 +3925,7 @@
           <a:p>
             <a:fld id="{E9005B36-101B-445A-8BDF-8403D2480BD0}" type="datetimeFigureOut">
               <a:rPr lang="en-US" smtClean="0"/>
-              <a:t>2/5/2020</a:t>
+              <a:t>2/6/2020</a:t>
             </a:fld>
             <a:endParaRPr lang="en-US"/>
           </a:p>
@@ -4236,7 +4236,7 @@
           <a:p>
             <a:fld id="{E9005B36-101B-445A-8BDF-8403D2480BD0}" type="datetimeFigureOut">
               <a:rPr lang="en-US" smtClean="0"/>
-              <a:t>2/5/2020</a:t>
+              <a:t>2/6/2020</a:t>
             </a:fld>
             <a:endParaRPr lang="en-US"/>
           </a:p>
@@ -4524,7 +4524,7 @@
           <a:p>
             <a:fld id="{E9005B36-101B-445A-8BDF-8403D2480BD0}" type="datetimeFigureOut">
               <a:rPr lang="en-US" smtClean="0"/>
-              <a:t>2/5/2020</a:t>
+              <a:t>2/6/2020</a:t>
             </a:fld>
             <a:endParaRPr lang="en-US"/>
           </a:p>
@@ -4765,7 +4765,7 @@
           <a:p>
             <a:fld id="{E9005B36-101B-445A-8BDF-8403D2480BD0}" type="datetimeFigureOut">
               <a:rPr lang="en-US" smtClean="0"/>
-              <a:t>2/5/2020</a:t>
+              <a:t>2/6/2020</a:t>
             </a:fld>
             <a:endParaRPr lang="en-US"/>
           </a:p>
@@ -5977,7 +5977,7 @@
         </p:nvSpPr>
         <p:spPr>
           <a:xfrm>
-            <a:off x="619668" y="5051817"/>
+            <a:off x="458954" y="4816695"/>
             <a:ext cx="1143818" cy="310393"/>
           </a:xfrm>
           <a:prstGeom prst="roundRect">
@@ -6037,7 +6037,7 @@
         </p:nvSpPr>
         <p:spPr>
           <a:xfrm>
-            <a:off x="1615652" y="4975052"/>
+            <a:off x="1454938" y="4739930"/>
             <a:ext cx="295667" cy="243279"/>
           </a:xfrm>
           <a:prstGeom prst="star5">
@@ -6091,7 +6091,7 @@
         </p:nvSpPr>
         <p:spPr>
           <a:xfrm>
-            <a:off x="605330" y="5635764"/>
+            <a:off x="444616" y="5400642"/>
             <a:ext cx="2130804" cy="310393"/>
           </a:xfrm>
           <a:prstGeom prst="roundRect">
@@ -6151,7 +6151,7 @@
         </p:nvSpPr>
         <p:spPr>
           <a:xfrm>
-            <a:off x="2454805" y="5588597"/>
+            <a:off x="2294091" y="5353475"/>
             <a:ext cx="295667" cy="243279"/>
           </a:xfrm>
           <a:prstGeom prst="star5">
@@ -7648,7 +7648,7 @@
         </p:nvSpPr>
         <p:spPr>
           <a:xfrm>
-            <a:off x="5234529" y="5313173"/>
+            <a:off x="3885138" y="5334371"/>
             <a:ext cx="2210862" cy="369332"/>
           </a:xfrm>
           <a:prstGeom prst="rect">
@@ -7680,6 +7680,255 @@
           </a:p>
         </p:txBody>
       </p:sp>
+      <p:sp>
+        <p:nvSpPr>
+          <p:cNvPr id="50" name="Rectangle 49">
+            <a:extLst>
+              <a:ext uri="{FF2B5EF4-FFF2-40B4-BE49-F238E27FC236}">
+                <a16:creationId xmlns:a16="http://schemas.microsoft.com/office/drawing/2014/main" id="{CF748CBF-F500-4E89-9B65-85F4C621A5EF}"/>
+              </a:ext>
+            </a:extLst>
+          </p:cNvPr>
+          <p:cNvSpPr/>
+          <p:nvPr/>
+        </p:nvSpPr>
+        <p:spPr>
+          <a:xfrm>
+            <a:off x="6805820" y="6014922"/>
+            <a:ext cx="1774845" cy="307777"/>
+          </a:xfrm>
+          <a:prstGeom prst="rect">
+            <a:avLst/>
+          </a:prstGeom>
+          <a:solidFill>
+            <a:srgbClr val="00B050"/>
+          </a:solidFill>
+        </p:spPr>
+        <p:txBody>
+          <a:bodyPr wrap="none">
+            <a:spAutoFit/>
+          </a:bodyPr>
+          <a:lstStyle/>
+          <a:p>
+            <a:r>
+              <a:rPr lang="en-US" sz="1400" b="1" dirty="0" err="1">
+                <a:latin typeface="Consolas" panose="020B0609020204030204" pitchFamily="49" charset="0"/>
+              </a:rPr>
+              <a:t>processChartData</a:t>
+            </a:r>
+            <a:endParaRPr lang="en-US" sz="1400" b="1" dirty="0">
+              <a:effectLst/>
+              <a:latin typeface="Consolas" panose="020B0609020204030204" pitchFamily="49" charset="0"/>
+            </a:endParaRPr>
+          </a:p>
+        </p:txBody>
+      </p:sp>
+      <p:cxnSp>
+        <p:nvCxnSpPr>
+          <p:cNvPr id="52" name="Straight Arrow Connector 51">
+            <a:extLst>
+              <a:ext uri="{FF2B5EF4-FFF2-40B4-BE49-F238E27FC236}">
+                <a16:creationId xmlns:a16="http://schemas.microsoft.com/office/drawing/2014/main" id="{887D2A66-98D6-49F6-B05D-3BD09EBAEBED}"/>
+              </a:ext>
+            </a:extLst>
+          </p:cNvPr>
+          <p:cNvCxnSpPr>
+            <a:cxnSpLocks/>
+            <a:stCxn id="7" idx="2"/>
+            <a:endCxn id="50" idx="0"/>
+          </p:cNvCxnSpPr>
+          <p:nvPr/>
+        </p:nvCxnSpPr>
+        <p:spPr>
+          <a:xfrm>
+            <a:off x="7671070" y="4524014"/>
+            <a:ext cx="22173" cy="1490908"/>
+          </a:xfrm>
+          <a:prstGeom prst="straightConnector1">
+            <a:avLst/>
+          </a:prstGeom>
+          <a:ln w="38100">
+            <a:solidFill>
+              <a:srgbClr val="00B050"/>
+            </a:solidFill>
+            <a:tailEnd type="triangle"/>
+          </a:ln>
+        </p:spPr>
+        <p:style>
+          <a:lnRef idx="1">
+            <a:schemeClr val="accent1"/>
+          </a:lnRef>
+          <a:fillRef idx="0">
+            <a:schemeClr val="accent1"/>
+          </a:fillRef>
+          <a:effectRef idx="0">
+            <a:schemeClr val="accent1"/>
+          </a:effectRef>
+          <a:fontRef idx="minor">
+            <a:schemeClr val="tx1"/>
+          </a:fontRef>
+        </p:style>
+      </p:cxnSp>
+      <p:sp>
+        <p:nvSpPr>
+          <p:cNvPr id="55" name="Rectangle: Rounded Corners 54">
+            <a:extLst>
+              <a:ext uri="{FF2B5EF4-FFF2-40B4-BE49-F238E27FC236}">
+                <a16:creationId xmlns:a16="http://schemas.microsoft.com/office/drawing/2014/main" id="{CB3CA25B-DCAB-4ABD-8492-318934D6CB7F}"/>
+              </a:ext>
+            </a:extLst>
+          </p:cNvPr>
+          <p:cNvSpPr/>
+          <p:nvPr/>
+        </p:nvSpPr>
+        <p:spPr>
+          <a:xfrm>
+            <a:off x="430278" y="6014922"/>
+            <a:ext cx="2130804" cy="310393"/>
+          </a:xfrm>
+          <a:prstGeom prst="roundRect">
+            <a:avLst/>
+          </a:prstGeom>
+          <a:solidFill>
+            <a:schemeClr val="accent2"/>
+          </a:solidFill>
+        </p:spPr>
+        <p:style>
+          <a:lnRef idx="2">
+            <a:schemeClr val="accent1">
+              <a:shade val="50000"/>
+            </a:schemeClr>
+          </a:lnRef>
+          <a:fillRef idx="1">
+            <a:schemeClr val="accent1"/>
+          </a:fillRef>
+          <a:effectRef idx="0">
+            <a:schemeClr val="accent1"/>
+          </a:effectRef>
+          <a:fontRef idx="minor">
+            <a:schemeClr val="lt1"/>
+          </a:fontRef>
+        </p:style>
+        <p:txBody>
+          <a:bodyPr rtlCol="0" anchor="ctr"/>
+          <a:lstStyle/>
+          <a:p>
+            <a:r>
+              <a:rPr lang="en-US" sz="1400" b="1" dirty="0" err="1">
+                <a:solidFill>
+                  <a:schemeClr val="tx1"/>
+                </a:solidFill>
+              </a:rPr>
+              <a:t>onShowDashboard</a:t>
+            </a:r>
+            <a:endParaRPr lang="en-US" sz="1400" b="1" dirty="0">
+              <a:solidFill>
+                <a:schemeClr val="tx1"/>
+              </a:solidFill>
+            </a:endParaRPr>
+          </a:p>
+        </p:txBody>
+      </p:sp>
+      <p:sp>
+        <p:nvSpPr>
+          <p:cNvPr id="56" name="Star: 5 Points 55">
+            <a:extLst>
+              <a:ext uri="{FF2B5EF4-FFF2-40B4-BE49-F238E27FC236}">
+                <a16:creationId xmlns:a16="http://schemas.microsoft.com/office/drawing/2014/main" id="{BB4201B9-90A2-47AD-B7B3-D53D2EA190CB}"/>
+              </a:ext>
+            </a:extLst>
+          </p:cNvPr>
+          <p:cNvSpPr/>
+          <p:nvPr/>
+        </p:nvSpPr>
+        <p:spPr>
+          <a:xfrm>
+            <a:off x="2279753" y="5967755"/>
+            <a:ext cx="295667" cy="243279"/>
+          </a:xfrm>
+          <a:prstGeom prst="star5">
+            <a:avLst/>
+          </a:prstGeom>
+          <a:solidFill>
+            <a:srgbClr val="FFFF00"/>
+          </a:solidFill>
+          <a:ln>
+            <a:solidFill>
+              <a:srgbClr val="FF0000"/>
+            </a:solidFill>
+          </a:ln>
+        </p:spPr>
+        <p:style>
+          <a:lnRef idx="2">
+            <a:schemeClr val="accent1">
+              <a:shade val="50000"/>
+            </a:schemeClr>
+          </a:lnRef>
+          <a:fillRef idx="1">
+            <a:schemeClr val="accent1"/>
+          </a:fillRef>
+          <a:effectRef idx="0">
+            <a:schemeClr val="accent1"/>
+          </a:effectRef>
+          <a:fontRef idx="minor">
+            <a:schemeClr val="lt1"/>
+          </a:fontRef>
+        </p:style>
+        <p:txBody>
+          <a:bodyPr rtlCol="0" anchor="ctr"/>
+          <a:lstStyle/>
+          <a:p>
+            <a:pPr algn="ctr"/>
+            <a:endParaRPr lang="en-US"/>
+          </a:p>
+        </p:txBody>
+      </p:sp>
+      <p:cxnSp>
+        <p:nvCxnSpPr>
+          <p:cNvPr id="58" name="Straight Arrow Connector 57">
+            <a:extLst>
+              <a:ext uri="{FF2B5EF4-FFF2-40B4-BE49-F238E27FC236}">
+                <a16:creationId xmlns:a16="http://schemas.microsoft.com/office/drawing/2014/main" id="{4BC57D4E-D5C8-4F03-96A1-F2EDCAAA6B39}"/>
+              </a:ext>
+            </a:extLst>
+          </p:cNvPr>
+          <p:cNvCxnSpPr>
+            <a:cxnSpLocks/>
+            <a:stCxn id="55" idx="3"/>
+            <a:endCxn id="50" idx="1"/>
+          </p:cNvCxnSpPr>
+          <p:nvPr/>
+        </p:nvCxnSpPr>
+        <p:spPr>
+          <a:xfrm flipV="1">
+            <a:off x="2561082" y="6168811"/>
+            <a:ext cx="4244738" cy="1308"/>
+          </a:xfrm>
+          <a:prstGeom prst="straightConnector1">
+            <a:avLst/>
+          </a:prstGeom>
+          <a:ln w="38100">
+            <a:solidFill>
+              <a:srgbClr val="00B050"/>
+            </a:solidFill>
+            <a:tailEnd type="triangle"/>
+          </a:ln>
+        </p:spPr>
+        <p:style>
+          <a:lnRef idx="1">
+            <a:schemeClr val="accent1"/>
+          </a:lnRef>
+          <a:fillRef idx="0">
+            <a:schemeClr val="accent1"/>
+          </a:fillRef>
+          <a:effectRef idx="0">
+            <a:schemeClr val="accent1"/>
+          </a:effectRef>
+          <a:fontRef idx="minor">
+            <a:schemeClr val="tx1"/>
+          </a:fontRef>
+        </p:style>
+      </p:cxnSp>
     </p:spTree>
     <p:extLst>
       <p:ext uri="{BB962C8B-B14F-4D97-AF65-F5344CB8AC3E}">
@@ -8797,6 +9046,49 @@
               <a:t>updateEnd</a:t>
             </a:r>
             <a:endParaRPr lang="en-US" sz="1200" dirty="0">
+              <a:latin typeface="Consolas" panose="020B0609020204030204" pitchFamily="49" charset="0"/>
+            </a:endParaRPr>
+          </a:p>
+        </p:txBody>
+      </p:sp>
+      <p:sp>
+        <p:nvSpPr>
+          <p:cNvPr id="2" name="Rectangle 1">
+            <a:extLst>
+              <a:ext uri="{FF2B5EF4-FFF2-40B4-BE49-F238E27FC236}">
+                <a16:creationId xmlns:a16="http://schemas.microsoft.com/office/drawing/2014/main" id="{FEC6C7A3-F9DA-4E91-B2E5-D2E439C71851}"/>
+              </a:ext>
+            </a:extLst>
+          </p:cNvPr>
+          <p:cNvSpPr/>
+          <p:nvPr/>
+        </p:nvSpPr>
+        <p:spPr>
+          <a:xfrm>
+            <a:off x="7233596" y="4334826"/>
+            <a:ext cx="1774845" cy="307777"/>
+          </a:xfrm>
+          <a:prstGeom prst="rect">
+            <a:avLst/>
+          </a:prstGeom>
+          <a:solidFill>
+            <a:srgbClr val="00B050"/>
+          </a:solidFill>
+        </p:spPr>
+        <p:txBody>
+          <a:bodyPr wrap="none">
+            <a:spAutoFit/>
+          </a:bodyPr>
+          <a:lstStyle/>
+          <a:p>
+            <a:r>
+              <a:rPr lang="en-US" sz="1400" b="1" dirty="0" err="1">
+                <a:latin typeface="Consolas" panose="020B0609020204030204" pitchFamily="49" charset="0"/>
+              </a:rPr>
+              <a:t>processChartData</a:t>
+            </a:r>
+            <a:endParaRPr lang="en-US" sz="1400" b="1" dirty="0">
+              <a:effectLst/>
               <a:latin typeface="Consolas" panose="020B0609020204030204" pitchFamily="49" charset="0"/>
             </a:endParaRPr>
           </a:p>

</xml_diff>